<commit_message>
Updated a md and presentation for 6th lesson
</commit_message>
<xml_diff>
--- a/lesson 6/Lesson_6.pptx
+++ b/lesson 6/Lesson_6.pptx
@@ -12,9 +12,9 @@
     <p:sldId id="258" r:id="rId3"/>
     <p:sldId id="282" r:id="rId4"/>
     <p:sldId id="283" r:id="rId5"/>
-    <p:sldId id="284" r:id="rId6"/>
-    <p:sldId id="285" r:id="rId7"/>
-    <p:sldId id="287" r:id="rId8"/>
+    <p:sldId id="285" r:id="rId6"/>
+    <p:sldId id="287" r:id="rId7"/>
+    <p:sldId id="284" r:id="rId8"/>
     <p:sldId id="288" r:id="rId9"/>
     <p:sldId id="286" r:id="rId10"/>
     <p:sldId id="266" r:id="rId11"/>
@@ -141,7 +141,7 @@
     <p1510:client id="{58A5EECA-69F4-A2C6-FD0E-DB58BAABE3E1}" v="170" dt="2021-12-08T11:52:11.015"/>
     <p1510:client id="{8D6854E7-4F17-FE40-59D2-55336647B245}" v="392" dt="2021-12-08T17:31:06.388"/>
     <p1510:client id="{9BFC776D-9240-A62B-7277-02C9E30D22CA}" v="479" dt="2021-12-08T17:59:18.181"/>
-    <p1510:client id="{C733B43C-8935-45B6-8711-BAAEEB00F0CD}" v="1767" dt="2021-12-15T07:40:47.776"/>
+    <p1510:client id="{C733B43C-8935-45B6-8711-BAAEEB00F0CD}" v="1775" dt="2021-12-15T08:02:42.161"/>
     <p1510:client id="{C89ACF45-C2F8-E76F-58EF-8272F11558CB}" v="235" dt="2021-12-02T10:05:05.975"/>
     <p1510:client id="{E143B352-6C6B-8238-531D-573B4674CE9C}" v="2349" dt="2021-12-07T09:23:16.743"/>
   </p1510:revLst>
@@ -14016,6 +14016,1804 @@
               <a:rPr lang="en-US" sz="2400" b="1" dirty="0" err="1">
                 <a:cs typeface="Calibri"/>
               </a:rPr>
+              <a:t>Кортеж</a:t>
+            </a:r>
+            <a:endParaRPr lang="en-US" dirty="0" err="1"/>
+          </a:p>
+        </p:txBody>
+      </p:sp>
+      <p:sp>
+        <p:nvSpPr>
+          <p:cNvPr id="4" name="TextBox 3">
+            <a:extLst>
+              <a:ext uri="{FF2B5EF4-FFF2-40B4-BE49-F238E27FC236}">
+                <a16:creationId xmlns:a16="http://schemas.microsoft.com/office/drawing/2014/main" id="{7975019D-68F9-4491-8ACA-091B8AB3002E}"/>
+              </a:ext>
+            </a:extLst>
+          </p:cNvPr>
+          <p:cNvSpPr txBox="1"/>
+          <p:nvPr/>
+        </p:nvSpPr>
+        <p:spPr>
+          <a:xfrm>
+            <a:off x="1253427" y="5274129"/>
+            <a:ext cx="9006154" cy="1200329"/>
+          </a:xfrm>
+          <a:prstGeom prst="rect">
+            <a:avLst/>
+          </a:prstGeom>
+          <a:noFill/>
+        </p:spPr>
+        <p:txBody>
+          <a:bodyPr rot="0" spcFirstLastPara="0" vertOverflow="overflow" horzOverflow="overflow" vert="horz" wrap="square" lIns="91440" tIns="45720" rIns="91440" bIns="45720" numCol="1" spcCol="0" rtlCol="0" fromWordArt="0" anchor="t" anchorCtr="0" forceAA="0" compatLnSpc="1">
+            <a:prstTxWarp prst="textNoShape">
+              <a:avLst/>
+            </a:prstTxWarp>
+            <a:spAutoFit/>
+          </a:bodyPr>
+          <a:lstStyle/>
+          <a:p>
+            <a:r>
+              <a:rPr lang="en-US" b="1" dirty="0" err="1">
+                <a:solidFill>
+                  <a:srgbClr val="FF6C3A"/>
+                </a:solidFill>
+                <a:ea typeface="+mn-lt"/>
+                <a:cs typeface="+mn-lt"/>
+              </a:rPr>
+              <a:t>Кортежи</a:t>
+            </a:r>
+            <a:r>
+              <a:rPr lang="en-US" b="1" dirty="0">
+                <a:solidFill>
+                  <a:srgbClr val="FF6C3A"/>
+                </a:solidFill>
+                <a:ea typeface="+mn-lt"/>
+                <a:cs typeface="+mn-lt"/>
+              </a:rPr>
+              <a:t> </a:t>
+            </a:r>
+            <a:r>
+              <a:rPr lang="en-US" dirty="0" err="1">
+                <a:ea typeface="+mn-lt"/>
+                <a:cs typeface="+mn-lt"/>
+              </a:rPr>
+              <a:t>служат</a:t>
+            </a:r>
+            <a:r>
+              <a:rPr lang="en-US" dirty="0">
+                <a:ea typeface="+mn-lt"/>
+                <a:cs typeface="+mn-lt"/>
+              </a:rPr>
+              <a:t> </a:t>
+            </a:r>
+            <a:r>
+              <a:rPr lang="en-US" dirty="0" err="1">
+                <a:ea typeface="+mn-lt"/>
+                <a:cs typeface="+mn-lt"/>
+              </a:rPr>
+              <a:t>для</a:t>
+            </a:r>
+            <a:r>
+              <a:rPr lang="en-US" dirty="0">
+                <a:ea typeface="+mn-lt"/>
+                <a:cs typeface="+mn-lt"/>
+              </a:rPr>
+              <a:t> </a:t>
+            </a:r>
+            <a:r>
+              <a:rPr lang="en-US" dirty="0" err="1">
+                <a:ea typeface="+mn-lt"/>
+                <a:cs typeface="+mn-lt"/>
+              </a:rPr>
+              <a:t>хранения</a:t>
+            </a:r>
+            <a:r>
+              <a:rPr lang="en-US" dirty="0">
+                <a:ea typeface="+mn-lt"/>
+                <a:cs typeface="+mn-lt"/>
+              </a:rPr>
+              <a:t> </a:t>
+            </a:r>
+            <a:r>
+              <a:rPr lang="en-US" dirty="0" err="1">
+                <a:ea typeface="+mn-lt"/>
+                <a:cs typeface="+mn-lt"/>
+              </a:rPr>
+              <a:t>нескольких</a:t>
+            </a:r>
+            <a:r>
+              <a:rPr lang="en-US" dirty="0">
+                <a:ea typeface="+mn-lt"/>
+                <a:cs typeface="+mn-lt"/>
+              </a:rPr>
+              <a:t> </a:t>
+            </a:r>
+            <a:r>
+              <a:rPr lang="en-US" dirty="0" err="1">
+                <a:ea typeface="+mn-lt"/>
+                <a:cs typeface="+mn-lt"/>
+              </a:rPr>
+              <a:t>объектов</a:t>
+            </a:r>
+            <a:r>
+              <a:rPr lang="en-US" dirty="0">
+                <a:ea typeface="+mn-lt"/>
+                <a:cs typeface="+mn-lt"/>
+              </a:rPr>
+              <a:t> </a:t>
+            </a:r>
+            <a:r>
+              <a:rPr lang="en-US" dirty="0" err="1">
+                <a:ea typeface="+mn-lt"/>
+                <a:cs typeface="+mn-lt"/>
+              </a:rPr>
+              <a:t>вместе</a:t>
+            </a:r>
+            <a:r>
+              <a:rPr lang="en-US" dirty="0">
+                <a:ea typeface="+mn-lt"/>
+                <a:cs typeface="+mn-lt"/>
+              </a:rPr>
+              <a:t>. </a:t>
+            </a:r>
+            <a:r>
+              <a:rPr lang="en-US" dirty="0" err="1">
+                <a:ea typeface="+mn-lt"/>
+                <a:cs typeface="+mn-lt"/>
+              </a:rPr>
+              <a:t>Одна</a:t>
+            </a:r>
+            <a:r>
+              <a:rPr lang="en-US" dirty="0">
+                <a:ea typeface="+mn-lt"/>
+                <a:cs typeface="+mn-lt"/>
+              </a:rPr>
+              <a:t> </a:t>
+            </a:r>
+            <a:r>
+              <a:rPr lang="en-US" dirty="0" err="1">
+                <a:ea typeface="+mn-lt"/>
+                <a:cs typeface="+mn-lt"/>
+              </a:rPr>
+              <a:t>из</a:t>
+            </a:r>
+            <a:r>
+              <a:rPr lang="en-US" dirty="0">
+                <a:ea typeface="+mn-lt"/>
+                <a:cs typeface="+mn-lt"/>
+              </a:rPr>
+              <a:t> </a:t>
+            </a:r>
+            <a:r>
+              <a:rPr lang="en-US" dirty="0" err="1">
+                <a:ea typeface="+mn-lt"/>
+                <a:cs typeface="+mn-lt"/>
+              </a:rPr>
+              <a:t>важнейших</a:t>
+            </a:r>
+            <a:r>
+              <a:rPr lang="en-US" dirty="0">
+                <a:ea typeface="+mn-lt"/>
+                <a:cs typeface="+mn-lt"/>
+              </a:rPr>
+              <a:t> </a:t>
+            </a:r>
+            <a:r>
+              <a:rPr lang="en-US" dirty="0" err="1">
+                <a:ea typeface="+mn-lt"/>
+                <a:cs typeface="+mn-lt"/>
+              </a:rPr>
+              <a:t>особенностей</a:t>
+            </a:r>
+            <a:r>
+              <a:rPr lang="en-US" dirty="0">
+                <a:ea typeface="+mn-lt"/>
+                <a:cs typeface="+mn-lt"/>
+              </a:rPr>
+              <a:t> </a:t>
+            </a:r>
+            <a:r>
+              <a:rPr lang="en-US" dirty="0" err="1">
+                <a:ea typeface="+mn-lt"/>
+                <a:cs typeface="+mn-lt"/>
+              </a:rPr>
+              <a:t>кортежей</a:t>
+            </a:r>
+            <a:r>
+              <a:rPr lang="en-US" dirty="0">
+                <a:ea typeface="+mn-lt"/>
+                <a:cs typeface="+mn-lt"/>
+              </a:rPr>
+              <a:t> </a:t>
+            </a:r>
+            <a:r>
+              <a:rPr lang="en-US" dirty="0" err="1">
+                <a:ea typeface="+mn-lt"/>
+                <a:cs typeface="+mn-lt"/>
+              </a:rPr>
+              <a:t>заключается</a:t>
+            </a:r>
+            <a:r>
+              <a:rPr lang="en-US" dirty="0">
+                <a:ea typeface="+mn-lt"/>
+                <a:cs typeface="+mn-lt"/>
+              </a:rPr>
+              <a:t> в </a:t>
+            </a:r>
+            <a:r>
+              <a:rPr lang="en-US" dirty="0" err="1">
+                <a:ea typeface="+mn-lt"/>
+                <a:cs typeface="+mn-lt"/>
+              </a:rPr>
+              <a:t>том</a:t>
+            </a:r>
+            <a:r>
+              <a:rPr lang="en-US" dirty="0">
+                <a:ea typeface="+mn-lt"/>
+                <a:cs typeface="+mn-lt"/>
+              </a:rPr>
+              <a:t>, </a:t>
+            </a:r>
+            <a:r>
+              <a:rPr lang="en-US" dirty="0" err="1">
+                <a:ea typeface="+mn-lt"/>
+                <a:cs typeface="+mn-lt"/>
+              </a:rPr>
+              <a:t>что</a:t>
+            </a:r>
+            <a:r>
+              <a:rPr lang="en-US" dirty="0">
+                <a:ea typeface="+mn-lt"/>
+                <a:cs typeface="+mn-lt"/>
+              </a:rPr>
+              <a:t> </a:t>
+            </a:r>
+            <a:r>
+              <a:rPr lang="en-US" dirty="0" err="1">
+                <a:ea typeface="+mn-lt"/>
+                <a:cs typeface="+mn-lt"/>
+              </a:rPr>
+              <a:t>они</a:t>
+            </a:r>
+            <a:r>
+              <a:rPr lang="en-US" dirty="0">
+                <a:ea typeface="+mn-lt"/>
+                <a:cs typeface="+mn-lt"/>
+              </a:rPr>
+              <a:t> </a:t>
+            </a:r>
+            <a:r>
+              <a:rPr lang="en-US" b="1" dirty="0" err="1">
+                <a:solidFill>
+                  <a:srgbClr val="FF6C3A"/>
+                </a:solidFill>
+                <a:ea typeface="+mn-lt"/>
+                <a:cs typeface="+mn-lt"/>
+              </a:rPr>
+              <a:t>неизменяемы</a:t>
+            </a:r>
+            <a:r>
+              <a:rPr lang="en-US" dirty="0">
+                <a:ea typeface="+mn-lt"/>
+                <a:cs typeface="+mn-lt"/>
+              </a:rPr>
+              <a:t>, </a:t>
+            </a:r>
+            <a:r>
+              <a:rPr lang="en-US" dirty="0" err="1">
+                <a:ea typeface="+mn-lt"/>
+                <a:cs typeface="+mn-lt"/>
+              </a:rPr>
+              <a:t>так</a:t>
+            </a:r>
+            <a:r>
+              <a:rPr lang="en-US" dirty="0">
+                <a:ea typeface="+mn-lt"/>
+                <a:cs typeface="+mn-lt"/>
+              </a:rPr>
+              <a:t> </a:t>
+            </a:r>
+            <a:r>
+              <a:rPr lang="en-US" dirty="0" err="1">
+                <a:ea typeface="+mn-lt"/>
+                <a:cs typeface="+mn-lt"/>
+              </a:rPr>
+              <a:t>же</a:t>
+            </a:r>
+            <a:r>
+              <a:rPr lang="en-US" dirty="0">
+                <a:ea typeface="+mn-lt"/>
+                <a:cs typeface="+mn-lt"/>
+              </a:rPr>
+              <a:t>, </a:t>
+            </a:r>
+            <a:r>
+              <a:rPr lang="en-US" dirty="0" err="1">
+                <a:ea typeface="+mn-lt"/>
+                <a:cs typeface="+mn-lt"/>
+              </a:rPr>
+              <a:t>как</a:t>
+            </a:r>
+            <a:r>
+              <a:rPr lang="en-US" dirty="0">
+                <a:ea typeface="+mn-lt"/>
+                <a:cs typeface="+mn-lt"/>
+              </a:rPr>
+              <a:t> и </a:t>
+            </a:r>
+            <a:r>
+              <a:rPr lang="en-US" dirty="0" err="1">
+                <a:ea typeface="+mn-lt"/>
+                <a:cs typeface="+mn-lt"/>
+              </a:rPr>
+              <a:t>строки</a:t>
+            </a:r>
+            <a:r>
+              <a:rPr lang="en-US" dirty="0">
+                <a:ea typeface="+mn-lt"/>
+                <a:cs typeface="+mn-lt"/>
+              </a:rPr>
+              <a:t>. </a:t>
+            </a:r>
+            <a:r>
+              <a:rPr lang="en-US" dirty="0" err="1">
+                <a:ea typeface="+mn-lt"/>
+                <a:cs typeface="+mn-lt"/>
+              </a:rPr>
+              <a:t>Т.е</a:t>
+            </a:r>
+            <a:r>
+              <a:rPr lang="en-US" dirty="0">
+                <a:ea typeface="+mn-lt"/>
+                <a:cs typeface="+mn-lt"/>
+              </a:rPr>
+              <a:t>. </a:t>
+            </a:r>
+            <a:r>
+              <a:rPr lang="en-US" dirty="0" err="1">
+                <a:ea typeface="+mn-lt"/>
+                <a:cs typeface="+mn-lt"/>
+              </a:rPr>
+              <a:t>модифицировать</a:t>
+            </a:r>
+            <a:r>
+              <a:rPr lang="en-US" dirty="0">
+                <a:ea typeface="+mn-lt"/>
+                <a:cs typeface="+mn-lt"/>
+              </a:rPr>
+              <a:t> </a:t>
+            </a:r>
+            <a:r>
+              <a:rPr lang="en-US" dirty="0" err="1">
+                <a:ea typeface="+mn-lt"/>
+                <a:cs typeface="+mn-lt"/>
+              </a:rPr>
+              <a:t>кортежи</a:t>
+            </a:r>
+            <a:r>
+              <a:rPr lang="en-US" dirty="0">
+                <a:ea typeface="+mn-lt"/>
+                <a:cs typeface="+mn-lt"/>
+              </a:rPr>
+              <a:t> </a:t>
+            </a:r>
+            <a:r>
+              <a:rPr lang="en-US" dirty="0" err="1">
+                <a:ea typeface="+mn-lt"/>
+                <a:cs typeface="+mn-lt"/>
+              </a:rPr>
+              <a:t>невозможно</a:t>
+            </a:r>
+            <a:r>
+              <a:rPr lang="en-US" dirty="0">
+                <a:ea typeface="+mn-lt"/>
+                <a:cs typeface="+mn-lt"/>
+              </a:rPr>
+              <a:t>.</a:t>
+            </a:r>
+            <a:br>
+              <a:rPr lang="en-US" dirty="0"/>
+            </a:br>
+            <a:endParaRPr lang="en-US">
+              <a:cs typeface="Calibri"/>
+            </a:endParaRPr>
+          </a:p>
+        </p:txBody>
+      </p:sp>
+      <p:pic>
+        <p:nvPicPr>
+          <p:cNvPr id="3" name="Picture 5">
+            <a:extLst>
+              <a:ext uri="{FF2B5EF4-FFF2-40B4-BE49-F238E27FC236}">
+                <a16:creationId xmlns:a16="http://schemas.microsoft.com/office/drawing/2014/main" id="{42EA3EC2-6CAD-420F-AFF8-FABA3E17C966}"/>
+              </a:ext>
+            </a:extLst>
+          </p:cNvPr>
+          <p:cNvPicPr>
+            <a:picLocks noChangeAspect="1"/>
+          </p:cNvPicPr>
+          <p:nvPr/>
+        </p:nvPicPr>
+        <p:blipFill>
+          <a:blip r:embed="rId2"/>
+          <a:stretch>
+            <a:fillRect/>
+          </a:stretch>
+        </p:blipFill>
+        <p:spPr>
+          <a:xfrm>
+            <a:off x="3442010" y="1282158"/>
+            <a:ext cx="5094248" cy="2862610"/>
+          </a:xfrm>
+          <a:prstGeom prst="rect">
+            <a:avLst/>
+          </a:prstGeom>
+        </p:spPr>
+      </p:pic>
+    </p:spTree>
+    <p:extLst>
+      <p:ext uri="{BB962C8B-B14F-4D97-AF65-F5344CB8AC3E}">
+        <p14:creationId xmlns:p14="http://schemas.microsoft.com/office/powerpoint/2010/main" val="2884253150"/>
+      </p:ext>
+    </p:extLst>
+  </p:cSld>
+  <p:clrMapOvr>
+    <a:masterClrMapping/>
+  </p:clrMapOvr>
+</p:sld>
+</file>
+
+<file path=ppt/slides/slide6.xml><?xml version="1.0" encoding="utf-8"?>
+<p:sld xmlns:a="http://schemas.openxmlformats.org/drawingml/2006/main" xmlns:r="http://schemas.openxmlformats.org/officeDocument/2006/relationships" xmlns:p="http://schemas.openxmlformats.org/presentationml/2006/main">
+  <p:cSld>
+    <p:spTree>
+      <p:nvGrpSpPr>
+        <p:cNvPr id="1" name=""/>
+        <p:cNvGrpSpPr/>
+        <p:nvPr/>
+      </p:nvGrpSpPr>
+      <p:grpSpPr>
+        <a:xfrm>
+          <a:off x="0" y="0"/>
+          <a:ext cx="0" cy="0"/>
+          <a:chOff x="0" y="0"/>
+          <a:chExt cx="0" cy="0"/>
+        </a:xfrm>
+      </p:grpSpPr>
+      <p:sp>
+        <p:nvSpPr>
+          <p:cNvPr id="5" name="TextBox 1">
+            <a:extLst>
+              <a:ext uri="{FF2B5EF4-FFF2-40B4-BE49-F238E27FC236}">
+                <a16:creationId xmlns:a16="http://schemas.microsoft.com/office/drawing/2014/main" id="{5080A0D0-CC8F-4CB8-8197-2F50804F40F7}"/>
+              </a:ext>
+            </a:extLst>
+          </p:cNvPr>
+          <p:cNvSpPr txBox="1"/>
+          <p:nvPr/>
+        </p:nvSpPr>
+        <p:spPr>
+          <a:xfrm>
+            <a:off x="4677526" y="213944"/>
+            <a:ext cx="3332727" cy="461665"/>
+          </a:xfrm>
+          <a:prstGeom prst="rect">
+            <a:avLst/>
+          </a:prstGeom>
+          <a:noFill/>
+        </p:spPr>
+        <p:txBody>
+          <a:bodyPr rot="0" spcFirstLastPara="0" vert="horz" wrap="square" lIns="91440" tIns="45720" rIns="91440" bIns="45720" numCol="1" spcCol="0" rtlCol="0" fromWordArt="0" anchor="t" anchorCtr="0" forceAA="0" compatLnSpc="1">
+            <a:prstTxWarp prst="textNoShape">
+              <a:avLst/>
+            </a:prstTxWarp>
+            <a:spAutoFit/>
+          </a:bodyPr>
+          <a:lstStyle>
+            <a:defPPr>
+              <a:defRPr lang="ru-RU"/>
+            </a:defPPr>
+            <a:lvl1pPr marL="0" algn="l" defTabSz="914400" rtl="0" eaLnBrk="1" latinLnBrk="0" hangingPunct="1">
+              <a:defRPr sz="1800" kern="1200">
+                <a:solidFill>
+                  <a:schemeClr val="tx1"/>
+                </a:solidFill>
+                <a:latin typeface="+mn-lt"/>
+                <a:ea typeface="+mn-ea"/>
+                <a:cs typeface="+mn-cs"/>
+              </a:defRPr>
+            </a:lvl1pPr>
+            <a:lvl2pPr marL="457200" algn="l" defTabSz="914400" rtl="0" eaLnBrk="1" latinLnBrk="0" hangingPunct="1">
+              <a:defRPr sz="1800" kern="1200">
+                <a:solidFill>
+                  <a:schemeClr val="tx1"/>
+                </a:solidFill>
+                <a:latin typeface="+mn-lt"/>
+                <a:ea typeface="+mn-ea"/>
+                <a:cs typeface="+mn-cs"/>
+              </a:defRPr>
+            </a:lvl2pPr>
+            <a:lvl3pPr marL="914400" algn="l" defTabSz="914400" rtl="0" eaLnBrk="1" latinLnBrk="0" hangingPunct="1">
+              <a:defRPr sz="1800" kern="1200">
+                <a:solidFill>
+                  <a:schemeClr val="tx1"/>
+                </a:solidFill>
+                <a:latin typeface="+mn-lt"/>
+                <a:ea typeface="+mn-ea"/>
+                <a:cs typeface="+mn-cs"/>
+              </a:defRPr>
+            </a:lvl3pPr>
+            <a:lvl4pPr marL="1371600" algn="l" defTabSz="914400" rtl="0" eaLnBrk="1" latinLnBrk="0" hangingPunct="1">
+              <a:defRPr sz="1800" kern="1200">
+                <a:solidFill>
+                  <a:schemeClr val="tx1"/>
+                </a:solidFill>
+                <a:latin typeface="+mn-lt"/>
+                <a:ea typeface="+mn-ea"/>
+                <a:cs typeface="+mn-cs"/>
+              </a:defRPr>
+            </a:lvl4pPr>
+            <a:lvl5pPr marL="1828800" algn="l" defTabSz="914400" rtl="0" eaLnBrk="1" latinLnBrk="0" hangingPunct="1">
+              <a:defRPr sz="1800" kern="1200">
+                <a:solidFill>
+                  <a:schemeClr val="tx1"/>
+                </a:solidFill>
+                <a:latin typeface="+mn-lt"/>
+                <a:ea typeface="+mn-ea"/>
+                <a:cs typeface="+mn-cs"/>
+              </a:defRPr>
+            </a:lvl5pPr>
+            <a:lvl6pPr marL="2286000" algn="l" defTabSz="914400" rtl="0" eaLnBrk="1" latinLnBrk="0" hangingPunct="1">
+              <a:defRPr sz="1800" kern="1200">
+                <a:solidFill>
+                  <a:schemeClr val="tx1"/>
+                </a:solidFill>
+                <a:latin typeface="+mn-lt"/>
+                <a:ea typeface="+mn-ea"/>
+                <a:cs typeface="+mn-cs"/>
+              </a:defRPr>
+            </a:lvl6pPr>
+            <a:lvl7pPr marL="2743200" algn="l" defTabSz="914400" rtl="0" eaLnBrk="1" latinLnBrk="0" hangingPunct="1">
+              <a:defRPr sz="1800" kern="1200">
+                <a:solidFill>
+                  <a:schemeClr val="tx1"/>
+                </a:solidFill>
+                <a:latin typeface="+mn-lt"/>
+                <a:ea typeface="+mn-ea"/>
+                <a:cs typeface="+mn-cs"/>
+              </a:defRPr>
+            </a:lvl7pPr>
+            <a:lvl8pPr marL="3200400" algn="l" defTabSz="914400" rtl="0" eaLnBrk="1" latinLnBrk="0" hangingPunct="1">
+              <a:defRPr sz="1800" kern="1200">
+                <a:solidFill>
+                  <a:schemeClr val="tx1"/>
+                </a:solidFill>
+                <a:latin typeface="+mn-lt"/>
+                <a:ea typeface="+mn-ea"/>
+                <a:cs typeface="+mn-cs"/>
+              </a:defRPr>
+            </a:lvl8pPr>
+            <a:lvl9pPr marL="3657600" algn="l" defTabSz="914400" rtl="0" eaLnBrk="1" latinLnBrk="0" hangingPunct="1">
+              <a:defRPr sz="1800" kern="1200">
+                <a:solidFill>
+                  <a:schemeClr val="tx1"/>
+                </a:solidFill>
+                <a:latin typeface="+mn-lt"/>
+                <a:ea typeface="+mn-ea"/>
+                <a:cs typeface="+mn-cs"/>
+              </a:defRPr>
+            </a:lvl9pPr>
+          </a:lstStyle>
+          <a:p>
+            <a:r>
+              <a:rPr lang="en-US" sz="2400" b="1" dirty="0" err="1">
+                <a:cs typeface="Calibri"/>
+              </a:rPr>
+              <a:t>Последовательности</a:t>
+            </a:r>
+            <a:endParaRPr lang="en-US" dirty="0" err="1"/>
+          </a:p>
+        </p:txBody>
+      </p:sp>
+      <p:sp>
+        <p:nvSpPr>
+          <p:cNvPr id="4" name="TextBox 3">
+            <a:extLst>
+              <a:ext uri="{FF2B5EF4-FFF2-40B4-BE49-F238E27FC236}">
+                <a16:creationId xmlns:a16="http://schemas.microsoft.com/office/drawing/2014/main" id="{7975019D-68F9-4491-8ACA-091B8AB3002E}"/>
+              </a:ext>
+            </a:extLst>
+          </p:cNvPr>
+          <p:cNvSpPr txBox="1"/>
+          <p:nvPr/>
+        </p:nvSpPr>
+        <p:spPr>
+          <a:xfrm>
+            <a:off x="398500" y="5617957"/>
+            <a:ext cx="11292154" cy="923330"/>
+          </a:xfrm>
+          <a:prstGeom prst="rect">
+            <a:avLst/>
+          </a:prstGeom>
+          <a:noFill/>
+        </p:spPr>
+        <p:txBody>
+          <a:bodyPr rot="0" spcFirstLastPara="0" vertOverflow="overflow" horzOverflow="overflow" vert="horz" wrap="square" lIns="91440" tIns="45720" rIns="91440" bIns="45720" numCol="1" spcCol="0" rtlCol="0" fromWordArt="0" anchor="t" anchorCtr="0" forceAA="0" compatLnSpc="1">
+            <a:prstTxWarp prst="textNoShape">
+              <a:avLst/>
+            </a:prstTxWarp>
+            <a:spAutoFit/>
+          </a:bodyPr>
+          <a:lstStyle/>
+          <a:p>
+            <a:pPr algn="ctr"/>
+            <a:r>
+              <a:rPr lang="en-US" dirty="0">
+                <a:ea typeface="+mn-lt"/>
+                <a:cs typeface="+mn-lt"/>
+              </a:rPr>
+              <a:t> </a:t>
+            </a:r>
+            <a:r>
+              <a:rPr lang="en-US" err="1">
+                <a:ea typeface="+mn-lt"/>
+                <a:cs typeface="+mn-lt"/>
+              </a:rPr>
+              <a:t>Основные</a:t>
+            </a:r>
+            <a:r>
+              <a:rPr lang="en-US" dirty="0">
+                <a:ea typeface="+mn-lt"/>
+                <a:cs typeface="+mn-lt"/>
+              </a:rPr>
+              <a:t> </a:t>
+            </a:r>
+            <a:r>
+              <a:rPr lang="en-US" err="1">
+                <a:ea typeface="+mn-lt"/>
+                <a:cs typeface="+mn-lt"/>
+              </a:rPr>
+              <a:t>возможности</a:t>
+            </a:r>
+            <a:r>
+              <a:rPr lang="en-US" dirty="0">
+                <a:ea typeface="+mn-lt"/>
+                <a:cs typeface="+mn-lt"/>
+              </a:rPr>
+              <a:t> – </a:t>
+            </a:r>
+            <a:r>
+              <a:rPr lang="en-US" err="1">
+                <a:ea typeface="+mn-lt"/>
+                <a:cs typeface="+mn-lt"/>
+              </a:rPr>
+              <a:t>это</a:t>
+            </a:r>
+            <a:r>
+              <a:rPr lang="en-US" dirty="0">
+                <a:ea typeface="+mn-lt"/>
+                <a:cs typeface="+mn-lt"/>
+              </a:rPr>
+              <a:t> </a:t>
+            </a:r>
+            <a:r>
+              <a:rPr lang="en-US" b="1" err="1">
+                <a:solidFill>
+                  <a:srgbClr val="FF6C3A"/>
+                </a:solidFill>
+                <a:ea typeface="+mn-lt"/>
+                <a:cs typeface="+mn-lt"/>
+              </a:rPr>
+              <a:t>проверка</a:t>
+            </a:r>
+            <a:r>
+              <a:rPr lang="en-US" b="1" dirty="0">
+                <a:solidFill>
+                  <a:srgbClr val="FF6C3A"/>
+                </a:solidFill>
+                <a:ea typeface="+mn-lt"/>
+                <a:cs typeface="+mn-lt"/>
+              </a:rPr>
+              <a:t> </a:t>
+            </a:r>
+            <a:r>
+              <a:rPr lang="en-US" b="1" err="1">
+                <a:solidFill>
+                  <a:srgbClr val="FF6C3A"/>
+                </a:solidFill>
+                <a:ea typeface="+mn-lt"/>
+                <a:cs typeface="+mn-lt"/>
+              </a:rPr>
+              <a:t>принадлежности</a:t>
+            </a:r>
+            <a:r>
+              <a:rPr lang="en-US" b="1" dirty="0">
+                <a:solidFill>
+                  <a:srgbClr val="FF6C3A"/>
+                </a:solidFill>
+                <a:ea typeface="+mn-lt"/>
+                <a:cs typeface="+mn-lt"/>
+              </a:rPr>
+              <a:t> </a:t>
+            </a:r>
+            <a:r>
+              <a:rPr lang="en-US" dirty="0">
+                <a:ea typeface="+mn-lt"/>
+                <a:cs typeface="+mn-lt"/>
+              </a:rPr>
+              <a:t>(</a:t>
+            </a:r>
+            <a:r>
+              <a:rPr lang="en-US" err="1">
+                <a:ea typeface="+mn-lt"/>
+                <a:cs typeface="+mn-lt"/>
+              </a:rPr>
+              <a:t>т.е</a:t>
+            </a:r>
+            <a:r>
+              <a:rPr lang="en-US" dirty="0">
+                <a:ea typeface="+mn-lt"/>
+                <a:cs typeface="+mn-lt"/>
+              </a:rPr>
+              <a:t>. </a:t>
+            </a:r>
+            <a:r>
+              <a:rPr lang="en-US" err="1">
+                <a:ea typeface="+mn-lt"/>
+                <a:cs typeface="+mn-lt"/>
+              </a:rPr>
+              <a:t>выражения</a:t>
+            </a:r>
+            <a:r>
+              <a:rPr lang="en-US" dirty="0">
+                <a:ea typeface="+mn-lt"/>
+                <a:cs typeface="+mn-lt"/>
+              </a:rPr>
+              <a:t> « in » и « not</a:t>
+            </a:r>
+          </a:p>
+          <a:p>
+            <a:pPr algn="ctr"/>
+            <a:r>
+              <a:rPr lang="en-US" dirty="0">
+                <a:ea typeface="+mn-lt"/>
+                <a:cs typeface="+mn-lt"/>
+              </a:rPr>
+              <a:t>in ») и </a:t>
+            </a:r>
+            <a:r>
+              <a:rPr lang="en-US" b="1" dirty="0" err="1">
+                <a:solidFill>
+                  <a:srgbClr val="FF6C3A"/>
+                </a:solidFill>
+                <a:ea typeface="+mn-lt"/>
+                <a:cs typeface="+mn-lt"/>
+              </a:rPr>
+              <a:t>оператор</a:t>
+            </a:r>
+            <a:r>
+              <a:rPr lang="en-US" b="1" dirty="0">
+                <a:solidFill>
+                  <a:srgbClr val="FF6C3A"/>
+                </a:solidFill>
+                <a:ea typeface="+mn-lt"/>
+                <a:cs typeface="+mn-lt"/>
+              </a:rPr>
+              <a:t> </a:t>
+            </a:r>
+            <a:r>
+              <a:rPr lang="en-US" b="1" dirty="0" err="1">
+                <a:solidFill>
+                  <a:srgbClr val="FF6C3A"/>
+                </a:solidFill>
+                <a:ea typeface="+mn-lt"/>
+                <a:cs typeface="+mn-lt"/>
+              </a:rPr>
+              <a:t>индексирования</a:t>
+            </a:r>
+            <a:r>
+              <a:rPr lang="en-US" dirty="0">
+                <a:ea typeface="+mn-lt"/>
+                <a:cs typeface="+mn-lt"/>
+              </a:rPr>
+              <a:t>, </a:t>
+            </a:r>
+            <a:r>
+              <a:rPr lang="en-US" dirty="0" err="1">
+                <a:ea typeface="+mn-lt"/>
+                <a:cs typeface="+mn-lt"/>
+              </a:rPr>
+              <a:t>позволяющий</a:t>
+            </a:r>
+            <a:r>
+              <a:rPr lang="en-US" dirty="0">
+                <a:ea typeface="+mn-lt"/>
+                <a:cs typeface="+mn-lt"/>
+              </a:rPr>
+              <a:t> </a:t>
+            </a:r>
+            <a:r>
+              <a:rPr lang="en-US" dirty="0" err="1">
+                <a:ea typeface="+mn-lt"/>
+                <a:cs typeface="+mn-lt"/>
+              </a:rPr>
+              <a:t>получить</a:t>
+            </a:r>
+            <a:r>
+              <a:rPr lang="en-US" dirty="0">
+                <a:ea typeface="+mn-lt"/>
+                <a:cs typeface="+mn-lt"/>
+              </a:rPr>
+              <a:t> </a:t>
+            </a:r>
+            <a:r>
+              <a:rPr lang="en-US" dirty="0" err="1">
+                <a:ea typeface="+mn-lt"/>
+                <a:cs typeface="+mn-lt"/>
+              </a:rPr>
+              <a:t>напрямую</a:t>
+            </a:r>
+            <a:r>
+              <a:rPr lang="en-US" dirty="0">
+                <a:ea typeface="+mn-lt"/>
+                <a:cs typeface="+mn-lt"/>
+              </a:rPr>
+              <a:t> </a:t>
+            </a:r>
+            <a:r>
+              <a:rPr lang="en-US" dirty="0" err="1">
+                <a:ea typeface="+mn-lt"/>
+                <a:cs typeface="+mn-lt"/>
+              </a:rPr>
+              <a:t>некоторый</a:t>
+            </a:r>
+            <a:r>
+              <a:rPr lang="en-US" dirty="0">
+                <a:ea typeface="+mn-lt"/>
+                <a:cs typeface="+mn-lt"/>
+              </a:rPr>
+              <a:t> </a:t>
+            </a:r>
+            <a:r>
+              <a:rPr lang="en-US" dirty="0" err="1">
+                <a:ea typeface="+mn-lt"/>
+                <a:cs typeface="+mn-lt"/>
+              </a:rPr>
+              <a:t>элемент</a:t>
+            </a:r>
+            <a:r>
+              <a:rPr lang="en-US" dirty="0">
+                <a:ea typeface="+mn-lt"/>
+                <a:cs typeface="+mn-lt"/>
+              </a:rPr>
+              <a:t> </a:t>
+            </a:r>
+            <a:r>
+              <a:rPr lang="en-US" dirty="0" err="1">
+                <a:ea typeface="+mn-lt"/>
+                <a:cs typeface="+mn-lt"/>
+              </a:rPr>
+              <a:t>последовательности</a:t>
+            </a:r>
+            <a:r>
+              <a:rPr lang="en-US" dirty="0">
+                <a:ea typeface="+mn-lt"/>
+                <a:cs typeface="+mn-lt"/>
+              </a:rPr>
+              <a:t>.</a:t>
+            </a:r>
+            <a:br>
+              <a:rPr lang="en-US" dirty="0"/>
+            </a:br>
+            <a:endParaRPr lang="en-US">
+              <a:cs typeface="Calibri"/>
+            </a:endParaRPr>
+          </a:p>
+        </p:txBody>
+      </p:sp>
+      <p:sp>
+        <p:nvSpPr>
+          <p:cNvPr id="2" name="Oval 1">
+            <a:extLst>
+              <a:ext uri="{FF2B5EF4-FFF2-40B4-BE49-F238E27FC236}">
+                <a16:creationId xmlns:a16="http://schemas.microsoft.com/office/drawing/2014/main" id="{E4A32D74-1F11-4CF5-8F7D-3521A4272859}"/>
+              </a:ext>
+            </a:extLst>
+          </p:cNvPr>
+          <p:cNvSpPr/>
+          <p:nvPr/>
+        </p:nvSpPr>
+        <p:spPr>
+          <a:xfrm>
+            <a:off x="3594410" y="1419922"/>
+            <a:ext cx="1449657" cy="1347438"/>
+          </a:xfrm>
+          <a:prstGeom prst="ellipse">
+            <a:avLst/>
+          </a:prstGeom>
+          <a:solidFill>
+            <a:srgbClr val="FF6C3A"/>
+          </a:solidFill>
+        </p:spPr>
+        <p:style>
+          <a:lnRef idx="2">
+            <a:schemeClr val="accent1">
+              <a:shade val="50000"/>
+            </a:schemeClr>
+          </a:lnRef>
+          <a:fillRef idx="1">
+            <a:schemeClr val="accent1"/>
+          </a:fillRef>
+          <a:effectRef idx="0">
+            <a:schemeClr val="accent1"/>
+          </a:effectRef>
+          <a:fontRef idx="minor">
+            <a:schemeClr val="lt1"/>
+          </a:fontRef>
+        </p:style>
+        <p:txBody>
+          <a:bodyPr rtlCol="0" anchor="ctr"/>
+          <a:lstStyle/>
+          <a:p>
+            <a:pPr algn="ctr"/>
+            <a:r>
+              <a:rPr lang="en-US" b="1" dirty="0" err="1">
+                <a:cs typeface="Calibri"/>
+              </a:rPr>
+              <a:t>Cписки</a:t>
+            </a:r>
+            <a:endParaRPr lang="en-US" b="1" dirty="0" err="1"/>
+          </a:p>
+        </p:txBody>
+      </p:sp>
+      <p:sp>
+        <p:nvSpPr>
+          <p:cNvPr id="6" name="Oval 5">
+            <a:extLst>
+              <a:ext uri="{FF2B5EF4-FFF2-40B4-BE49-F238E27FC236}">
+                <a16:creationId xmlns:a16="http://schemas.microsoft.com/office/drawing/2014/main" id="{42661127-69F5-4881-8E64-68D9B1A21F91}"/>
+              </a:ext>
+            </a:extLst>
+          </p:cNvPr>
+          <p:cNvSpPr/>
+          <p:nvPr/>
+        </p:nvSpPr>
+        <p:spPr>
+          <a:xfrm>
+            <a:off x="5211337" y="1419922"/>
+            <a:ext cx="1505413" cy="1347438"/>
+          </a:xfrm>
+          <a:prstGeom prst="ellipse">
+            <a:avLst/>
+          </a:prstGeom>
+          <a:solidFill>
+            <a:srgbClr val="FF6C3A"/>
+          </a:solidFill>
+        </p:spPr>
+        <p:style>
+          <a:lnRef idx="2">
+            <a:schemeClr val="accent1">
+              <a:shade val="50000"/>
+            </a:schemeClr>
+          </a:lnRef>
+          <a:fillRef idx="1">
+            <a:schemeClr val="accent1"/>
+          </a:fillRef>
+          <a:effectRef idx="0">
+            <a:schemeClr val="accent1"/>
+          </a:effectRef>
+          <a:fontRef idx="minor">
+            <a:schemeClr val="lt1"/>
+          </a:fontRef>
+        </p:style>
+        <p:txBody>
+          <a:bodyPr lIns="91440" tIns="45720" rIns="91440" bIns="45720" rtlCol="0" anchor="ctr"/>
+          <a:lstStyle/>
+          <a:p>
+            <a:pPr algn="ctr"/>
+            <a:r>
+              <a:rPr lang="en-US" b="1" dirty="0" err="1">
+                <a:cs typeface="Calibri"/>
+              </a:rPr>
+              <a:t>Кортежи</a:t>
+            </a:r>
+            <a:endParaRPr lang="en-US" b="1" dirty="0" err="1"/>
+          </a:p>
+        </p:txBody>
+      </p:sp>
+      <p:sp>
+        <p:nvSpPr>
+          <p:cNvPr id="7" name="Oval 6">
+            <a:extLst>
+              <a:ext uri="{FF2B5EF4-FFF2-40B4-BE49-F238E27FC236}">
+                <a16:creationId xmlns:a16="http://schemas.microsoft.com/office/drawing/2014/main" id="{A2B0BE34-59FB-4ACC-B835-83FA46D93F71}"/>
+              </a:ext>
+            </a:extLst>
+          </p:cNvPr>
+          <p:cNvSpPr/>
+          <p:nvPr/>
+        </p:nvSpPr>
+        <p:spPr>
+          <a:xfrm>
+            <a:off x="6884019" y="1373459"/>
+            <a:ext cx="1449657" cy="1347438"/>
+          </a:xfrm>
+          <a:prstGeom prst="ellipse">
+            <a:avLst/>
+          </a:prstGeom>
+          <a:solidFill>
+            <a:srgbClr val="FF6C3A"/>
+          </a:solidFill>
+        </p:spPr>
+        <p:style>
+          <a:lnRef idx="2">
+            <a:schemeClr val="accent1">
+              <a:shade val="50000"/>
+            </a:schemeClr>
+          </a:lnRef>
+          <a:fillRef idx="1">
+            <a:schemeClr val="accent1"/>
+          </a:fillRef>
+          <a:effectRef idx="0">
+            <a:schemeClr val="accent1"/>
+          </a:effectRef>
+          <a:fontRef idx="minor">
+            <a:schemeClr val="lt1"/>
+          </a:fontRef>
+        </p:style>
+        <p:txBody>
+          <a:bodyPr lIns="91440" tIns="45720" rIns="91440" bIns="45720" rtlCol="0" anchor="ctr"/>
+          <a:lstStyle/>
+          <a:p>
+            <a:pPr algn="ctr"/>
+            <a:r>
+              <a:rPr lang="en-US" b="1" dirty="0">
+                <a:cs typeface="Calibri"/>
+              </a:rPr>
+              <a:t>Строки</a:t>
+            </a:r>
+            <a:endParaRPr lang="en-US" b="1" dirty="0" err="1"/>
+          </a:p>
+        </p:txBody>
+      </p:sp>
+      <p:grpSp>
+        <p:nvGrpSpPr>
+          <p:cNvPr id="12" name="Group 11">
+            <a:extLst>
+              <a:ext uri="{FF2B5EF4-FFF2-40B4-BE49-F238E27FC236}">
+                <a16:creationId xmlns:a16="http://schemas.microsoft.com/office/drawing/2014/main" id="{5B6A03DC-79D0-400E-AB0B-6343140E98BC}"/>
+              </a:ext>
+            </a:extLst>
+          </p:cNvPr>
+          <p:cNvGrpSpPr/>
+          <p:nvPr/>
+        </p:nvGrpSpPr>
+        <p:grpSpPr>
+          <a:xfrm>
+            <a:off x="2476966" y="2943280"/>
+            <a:ext cx="3010827" cy="1485148"/>
+            <a:chOff x="2476966" y="2943280"/>
+            <a:chExt cx="3010827" cy="1485148"/>
+          </a:xfrm>
+        </p:grpSpPr>
+        <p:sp>
+          <p:nvSpPr>
+            <p:cNvPr id="8" name="Arrow: Down 7">
+              <a:extLst>
+                <a:ext uri="{FF2B5EF4-FFF2-40B4-BE49-F238E27FC236}">
+                  <a16:creationId xmlns:a16="http://schemas.microsoft.com/office/drawing/2014/main" id="{451256DB-4718-4826-AFAA-40723CAF37C4}"/>
+                </a:ext>
+              </a:extLst>
+            </p:cNvPr>
+            <p:cNvSpPr/>
+            <p:nvPr/>
+          </p:nvSpPr>
+          <p:spPr>
+            <a:xfrm rot="1980000">
+              <a:off x="4723460" y="2943280"/>
+              <a:ext cx="483219" cy="659780"/>
+            </a:xfrm>
+            <a:prstGeom prst="downArrow">
+              <a:avLst/>
+            </a:prstGeom>
+            <a:solidFill>
+              <a:srgbClr val="001D3C"/>
+            </a:solidFill>
+          </p:spPr>
+          <p:style>
+            <a:lnRef idx="2">
+              <a:schemeClr val="accent1">
+                <a:shade val="50000"/>
+              </a:schemeClr>
+            </a:lnRef>
+            <a:fillRef idx="1">
+              <a:schemeClr val="accent1"/>
+            </a:fillRef>
+            <a:effectRef idx="0">
+              <a:schemeClr val="accent1"/>
+            </a:effectRef>
+            <a:fontRef idx="minor">
+              <a:schemeClr val="lt1"/>
+            </a:fontRef>
+          </p:style>
+          <p:txBody>
+            <a:bodyPr rtlCol="0" anchor="ctr"/>
+            <a:lstStyle/>
+            <a:p>
+              <a:pPr algn="ctr"/>
+              <a:endParaRPr lang="en-US"/>
+            </a:p>
+          </p:txBody>
+        </p:sp>
+        <p:sp>
+          <p:nvSpPr>
+            <p:cNvPr id="10" name="Rectangle: Rounded Corners 9">
+              <a:extLst>
+                <a:ext uri="{FF2B5EF4-FFF2-40B4-BE49-F238E27FC236}">
+                  <a16:creationId xmlns:a16="http://schemas.microsoft.com/office/drawing/2014/main" id="{4E1B57F4-57F6-41C8-AECC-D7149EC5BCDA}"/>
+                </a:ext>
+              </a:extLst>
+            </p:cNvPr>
+            <p:cNvSpPr/>
+            <p:nvPr/>
+          </p:nvSpPr>
+          <p:spPr>
+            <a:xfrm>
+              <a:off x="2476966" y="3787233"/>
+              <a:ext cx="3010827" cy="641195"/>
+            </a:xfrm>
+            <a:prstGeom prst="roundRect">
+              <a:avLst/>
+            </a:prstGeom>
+            <a:solidFill>
+              <a:srgbClr val="FF6C3A"/>
+            </a:solidFill>
+          </p:spPr>
+          <p:style>
+            <a:lnRef idx="2">
+              <a:schemeClr val="accent1">
+                <a:shade val="50000"/>
+              </a:schemeClr>
+            </a:lnRef>
+            <a:fillRef idx="1">
+              <a:schemeClr val="accent1"/>
+            </a:fillRef>
+            <a:effectRef idx="0">
+              <a:schemeClr val="accent1"/>
+            </a:effectRef>
+            <a:fontRef idx="minor">
+              <a:schemeClr val="lt1"/>
+            </a:fontRef>
+          </p:style>
+          <p:txBody>
+            <a:bodyPr rtlCol="0" anchor="ctr"/>
+            <a:lstStyle/>
+            <a:p>
+              <a:pPr algn="ctr"/>
+              <a:r>
+                <a:rPr lang="en-US" dirty="0" err="1">
+                  <a:cs typeface="Calibri"/>
+                </a:rPr>
+                <a:t>Проверка</a:t>
+              </a:r>
+              <a:r>
+                <a:rPr lang="en-US" dirty="0">
+                  <a:cs typeface="Calibri"/>
+                </a:rPr>
+                <a:t> </a:t>
+              </a:r>
+              <a:r>
+                <a:rPr lang="en-US" dirty="0" err="1">
+                  <a:cs typeface="Calibri"/>
+                </a:rPr>
+                <a:t>принадлежности</a:t>
+              </a:r>
+              <a:endParaRPr lang="en-US" dirty="0" err="1"/>
+            </a:p>
+          </p:txBody>
+        </p:sp>
+      </p:grpSp>
+      <p:grpSp>
+        <p:nvGrpSpPr>
+          <p:cNvPr id="13" name="Group 12">
+            <a:extLst>
+              <a:ext uri="{FF2B5EF4-FFF2-40B4-BE49-F238E27FC236}">
+                <a16:creationId xmlns:a16="http://schemas.microsoft.com/office/drawing/2014/main" id="{F8D68F03-2463-4891-8B7B-BBECD26E3207}"/>
+              </a:ext>
+            </a:extLst>
+          </p:cNvPr>
+          <p:cNvGrpSpPr/>
+          <p:nvPr/>
+        </p:nvGrpSpPr>
+        <p:grpSpPr>
+          <a:xfrm>
+            <a:off x="6630795" y="2943280"/>
+            <a:ext cx="3010827" cy="1485148"/>
+            <a:chOff x="6630795" y="2943280"/>
+            <a:chExt cx="3010827" cy="1485148"/>
+          </a:xfrm>
+        </p:grpSpPr>
+        <p:sp>
+          <p:nvSpPr>
+            <p:cNvPr id="9" name="Arrow: Down 8">
+              <a:extLst>
+                <a:ext uri="{FF2B5EF4-FFF2-40B4-BE49-F238E27FC236}">
+                  <a16:creationId xmlns:a16="http://schemas.microsoft.com/office/drawing/2014/main" id="{851FA8E3-0CE0-46C4-A7D3-7E495615ECDC}"/>
+                </a:ext>
+              </a:extLst>
+            </p:cNvPr>
+            <p:cNvSpPr/>
+            <p:nvPr/>
+          </p:nvSpPr>
+          <p:spPr>
+            <a:xfrm rot="-2160000">
+              <a:off x="6712094" y="2943280"/>
+              <a:ext cx="483219" cy="659780"/>
+            </a:xfrm>
+            <a:prstGeom prst="downArrow">
+              <a:avLst/>
+            </a:prstGeom>
+            <a:solidFill>
+              <a:srgbClr val="001D3C"/>
+            </a:solidFill>
+          </p:spPr>
+          <p:style>
+            <a:lnRef idx="2">
+              <a:schemeClr val="accent1">
+                <a:shade val="50000"/>
+              </a:schemeClr>
+            </a:lnRef>
+            <a:fillRef idx="1">
+              <a:schemeClr val="accent1"/>
+            </a:fillRef>
+            <a:effectRef idx="0">
+              <a:schemeClr val="accent1"/>
+            </a:effectRef>
+            <a:fontRef idx="minor">
+              <a:schemeClr val="lt1"/>
+            </a:fontRef>
+          </p:style>
+          <p:txBody>
+            <a:bodyPr lIns="91440" tIns="45720" rIns="91440" bIns="45720" rtlCol="0" anchor="ctr"/>
+            <a:lstStyle/>
+            <a:p>
+              <a:pPr algn="ctr"/>
+              <a:endParaRPr lang="en-US" dirty="0">
+                <a:solidFill>
+                  <a:srgbClr val="001D3C"/>
+                </a:solidFill>
+                <a:cs typeface="Calibri"/>
+              </a:endParaRPr>
+            </a:p>
+          </p:txBody>
+        </p:sp>
+        <p:sp>
+          <p:nvSpPr>
+            <p:cNvPr id="11" name="Rectangle: Rounded Corners 10">
+              <a:extLst>
+                <a:ext uri="{FF2B5EF4-FFF2-40B4-BE49-F238E27FC236}">
+                  <a16:creationId xmlns:a16="http://schemas.microsoft.com/office/drawing/2014/main" id="{A78E3998-C2BC-48AA-ADE7-CF1CBF32F620}"/>
+                </a:ext>
+              </a:extLst>
+            </p:cNvPr>
+            <p:cNvSpPr/>
+            <p:nvPr/>
+          </p:nvSpPr>
+          <p:spPr>
+            <a:xfrm>
+              <a:off x="6630795" y="3787233"/>
+              <a:ext cx="3010827" cy="641195"/>
+            </a:xfrm>
+            <a:prstGeom prst="roundRect">
+              <a:avLst/>
+            </a:prstGeom>
+            <a:solidFill>
+              <a:srgbClr val="FF6C3A"/>
+            </a:solidFill>
+          </p:spPr>
+          <p:style>
+            <a:lnRef idx="2">
+              <a:schemeClr val="accent1">
+                <a:shade val="50000"/>
+              </a:schemeClr>
+            </a:lnRef>
+            <a:fillRef idx="1">
+              <a:schemeClr val="accent1"/>
+            </a:fillRef>
+            <a:effectRef idx="0">
+              <a:schemeClr val="accent1"/>
+            </a:effectRef>
+            <a:fontRef idx="minor">
+              <a:schemeClr val="lt1"/>
+            </a:fontRef>
+          </p:style>
+          <p:txBody>
+            <a:bodyPr lIns="91440" tIns="45720" rIns="91440" bIns="45720" rtlCol="0" anchor="ctr"/>
+            <a:lstStyle/>
+            <a:p>
+              <a:pPr algn="ctr"/>
+              <a:r>
+                <a:rPr lang="en-US" dirty="0" err="1">
+                  <a:cs typeface="Calibri"/>
+                </a:rPr>
+                <a:t>Оператор</a:t>
+              </a:r>
+              <a:r>
+                <a:rPr lang="en-US" dirty="0">
+                  <a:cs typeface="Calibri"/>
+                </a:rPr>
+                <a:t> </a:t>
+              </a:r>
+              <a:r>
+                <a:rPr lang="en-US" dirty="0" err="1">
+                  <a:cs typeface="Calibri"/>
+                </a:rPr>
+                <a:t>индексирования</a:t>
+              </a:r>
+            </a:p>
+          </p:txBody>
+        </p:sp>
+      </p:grpSp>
+    </p:spTree>
+    <p:extLst>
+      <p:ext uri="{BB962C8B-B14F-4D97-AF65-F5344CB8AC3E}">
+        <p14:creationId xmlns:p14="http://schemas.microsoft.com/office/powerpoint/2010/main" val="2316149695"/>
+      </p:ext>
+    </p:extLst>
+  </p:cSld>
+  <p:clrMapOvr>
+    <a:masterClrMapping/>
+  </p:clrMapOvr>
+  <p:timing>
+    <p:tnLst>
+      <p:par>
+        <p:cTn id="1" dur="indefinite" restart="never" nodeType="tmRoot">
+          <p:childTnLst>
+            <p:seq concurrent="1" nextAc="seek">
+              <p:cTn id="2" dur="indefinite" nodeType="mainSeq">
+                <p:childTnLst>
+                  <p:par>
+                    <p:cTn id="3" fill="hold">
+                      <p:stCondLst>
+                        <p:cond delay="indefinite"/>
+                      </p:stCondLst>
+                      <p:childTnLst>
+                        <p:par>
+                          <p:cTn id="4" fill="hold">
+                            <p:stCondLst>
+                              <p:cond delay="0"/>
+                            </p:stCondLst>
+                            <p:childTnLst>
+                              <p:par>
+                                <p:cTn id="5" presetID="10" presetClass="entr" presetSubtype="0" fill="hold" grpId="0" nodeType="clickEffect">
+                                  <p:stCondLst>
+                                    <p:cond delay="0"/>
+                                  </p:stCondLst>
+                                  <p:childTnLst>
+                                    <p:set>
+                                      <p:cBhvr>
+                                        <p:cTn id="6" dur="1" fill="hold">
+                                          <p:stCondLst>
+                                            <p:cond delay="0"/>
+                                          </p:stCondLst>
+                                        </p:cTn>
+                                        <p:tgtEl>
+                                          <p:spTgt spid="2"/>
+                                        </p:tgtEl>
+                                        <p:attrNameLst>
+                                          <p:attrName>style.visibility</p:attrName>
+                                        </p:attrNameLst>
+                                      </p:cBhvr>
+                                      <p:to>
+                                        <p:strVal val="visible"/>
+                                      </p:to>
+                                    </p:set>
+                                    <p:animEffect transition="in" filter="fade">
+                                      <p:cBhvr>
+                                        <p:cTn id="7" dur="500"/>
+                                        <p:tgtEl>
+                                          <p:spTgt spid="2"/>
+                                        </p:tgtEl>
+                                      </p:cBhvr>
+                                    </p:animEffect>
+                                  </p:childTnLst>
+                                </p:cTn>
+                              </p:par>
+                            </p:childTnLst>
+                          </p:cTn>
+                        </p:par>
+                      </p:childTnLst>
+                    </p:cTn>
+                  </p:par>
+                  <p:par>
+                    <p:cTn id="8" fill="hold">
+                      <p:stCondLst>
+                        <p:cond delay="indefinite"/>
+                      </p:stCondLst>
+                      <p:childTnLst>
+                        <p:par>
+                          <p:cTn id="9" fill="hold">
+                            <p:stCondLst>
+                              <p:cond delay="0"/>
+                            </p:stCondLst>
+                            <p:childTnLst>
+                              <p:par>
+                                <p:cTn id="10" presetID="10" presetClass="entr" presetSubtype="0" fill="hold" grpId="0" nodeType="clickEffect">
+                                  <p:stCondLst>
+                                    <p:cond delay="0"/>
+                                  </p:stCondLst>
+                                  <p:childTnLst>
+                                    <p:set>
+                                      <p:cBhvr>
+                                        <p:cTn id="11" dur="1" fill="hold">
+                                          <p:stCondLst>
+                                            <p:cond delay="0"/>
+                                          </p:stCondLst>
+                                        </p:cTn>
+                                        <p:tgtEl>
+                                          <p:spTgt spid="6"/>
+                                        </p:tgtEl>
+                                        <p:attrNameLst>
+                                          <p:attrName>style.visibility</p:attrName>
+                                        </p:attrNameLst>
+                                      </p:cBhvr>
+                                      <p:to>
+                                        <p:strVal val="visible"/>
+                                      </p:to>
+                                    </p:set>
+                                    <p:animEffect transition="in" filter="fade">
+                                      <p:cBhvr>
+                                        <p:cTn id="12" dur="500"/>
+                                        <p:tgtEl>
+                                          <p:spTgt spid="6"/>
+                                        </p:tgtEl>
+                                      </p:cBhvr>
+                                    </p:animEffect>
+                                  </p:childTnLst>
+                                </p:cTn>
+                              </p:par>
+                            </p:childTnLst>
+                          </p:cTn>
+                        </p:par>
+                      </p:childTnLst>
+                    </p:cTn>
+                  </p:par>
+                  <p:par>
+                    <p:cTn id="13" fill="hold">
+                      <p:stCondLst>
+                        <p:cond delay="indefinite"/>
+                      </p:stCondLst>
+                      <p:childTnLst>
+                        <p:par>
+                          <p:cTn id="14" fill="hold">
+                            <p:stCondLst>
+                              <p:cond delay="0"/>
+                            </p:stCondLst>
+                            <p:childTnLst>
+                              <p:par>
+                                <p:cTn id="15" presetID="10" presetClass="entr" presetSubtype="0" fill="hold" grpId="0" nodeType="clickEffect">
+                                  <p:stCondLst>
+                                    <p:cond delay="0"/>
+                                  </p:stCondLst>
+                                  <p:childTnLst>
+                                    <p:set>
+                                      <p:cBhvr>
+                                        <p:cTn id="16" dur="1" fill="hold">
+                                          <p:stCondLst>
+                                            <p:cond delay="0"/>
+                                          </p:stCondLst>
+                                        </p:cTn>
+                                        <p:tgtEl>
+                                          <p:spTgt spid="7"/>
+                                        </p:tgtEl>
+                                        <p:attrNameLst>
+                                          <p:attrName>style.visibility</p:attrName>
+                                        </p:attrNameLst>
+                                      </p:cBhvr>
+                                      <p:to>
+                                        <p:strVal val="visible"/>
+                                      </p:to>
+                                    </p:set>
+                                    <p:animEffect transition="in" filter="fade">
+                                      <p:cBhvr>
+                                        <p:cTn id="17" dur="500"/>
+                                        <p:tgtEl>
+                                          <p:spTgt spid="7"/>
+                                        </p:tgtEl>
+                                      </p:cBhvr>
+                                    </p:animEffect>
+                                  </p:childTnLst>
+                                </p:cTn>
+                              </p:par>
+                            </p:childTnLst>
+                          </p:cTn>
+                        </p:par>
+                      </p:childTnLst>
+                    </p:cTn>
+                  </p:par>
+                  <p:par>
+                    <p:cTn id="18" fill="hold">
+                      <p:stCondLst>
+                        <p:cond delay="indefinite"/>
+                      </p:stCondLst>
+                      <p:childTnLst>
+                        <p:par>
+                          <p:cTn id="19" fill="hold">
+                            <p:stCondLst>
+                              <p:cond delay="0"/>
+                            </p:stCondLst>
+                            <p:childTnLst>
+                              <p:par>
+                                <p:cTn id="20" presetID="10" presetClass="entr" presetSubtype="0" fill="hold" nodeType="clickEffect">
+                                  <p:stCondLst>
+                                    <p:cond delay="0"/>
+                                  </p:stCondLst>
+                                  <p:childTnLst>
+                                    <p:set>
+                                      <p:cBhvr>
+                                        <p:cTn id="21" dur="1" fill="hold">
+                                          <p:stCondLst>
+                                            <p:cond delay="0"/>
+                                          </p:stCondLst>
+                                        </p:cTn>
+                                        <p:tgtEl>
+                                          <p:spTgt spid="12"/>
+                                        </p:tgtEl>
+                                        <p:attrNameLst>
+                                          <p:attrName>style.visibility</p:attrName>
+                                        </p:attrNameLst>
+                                      </p:cBhvr>
+                                      <p:to>
+                                        <p:strVal val="visible"/>
+                                      </p:to>
+                                    </p:set>
+                                    <p:animEffect transition="in" filter="fade">
+                                      <p:cBhvr>
+                                        <p:cTn id="22" dur="500"/>
+                                        <p:tgtEl>
+                                          <p:spTgt spid="12"/>
+                                        </p:tgtEl>
+                                      </p:cBhvr>
+                                    </p:animEffect>
+                                  </p:childTnLst>
+                                </p:cTn>
+                              </p:par>
+                            </p:childTnLst>
+                          </p:cTn>
+                        </p:par>
+                      </p:childTnLst>
+                    </p:cTn>
+                  </p:par>
+                  <p:par>
+                    <p:cTn id="23" fill="hold">
+                      <p:stCondLst>
+                        <p:cond delay="indefinite"/>
+                      </p:stCondLst>
+                      <p:childTnLst>
+                        <p:par>
+                          <p:cTn id="24" fill="hold">
+                            <p:stCondLst>
+                              <p:cond delay="0"/>
+                            </p:stCondLst>
+                            <p:childTnLst>
+                              <p:par>
+                                <p:cTn id="25" presetID="10" presetClass="entr" presetSubtype="0" fill="hold" nodeType="clickEffect">
+                                  <p:stCondLst>
+                                    <p:cond delay="0"/>
+                                  </p:stCondLst>
+                                  <p:childTnLst>
+                                    <p:set>
+                                      <p:cBhvr>
+                                        <p:cTn id="26" dur="1" fill="hold">
+                                          <p:stCondLst>
+                                            <p:cond delay="0"/>
+                                          </p:stCondLst>
+                                        </p:cTn>
+                                        <p:tgtEl>
+                                          <p:spTgt spid="13"/>
+                                        </p:tgtEl>
+                                        <p:attrNameLst>
+                                          <p:attrName>style.visibility</p:attrName>
+                                        </p:attrNameLst>
+                                      </p:cBhvr>
+                                      <p:to>
+                                        <p:strVal val="visible"/>
+                                      </p:to>
+                                    </p:set>
+                                    <p:animEffect transition="in" filter="fade">
+                                      <p:cBhvr>
+                                        <p:cTn id="27" dur="500"/>
+                                        <p:tgtEl>
+                                          <p:spTgt spid="13"/>
+                                        </p:tgtEl>
+                                      </p:cBhvr>
+                                    </p:animEffect>
+                                  </p:childTnLst>
+                                </p:cTn>
+                              </p:par>
+                            </p:childTnLst>
+                          </p:cTn>
+                        </p:par>
+                      </p:childTnLst>
+                    </p:cTn>
+                  </p:par>
+                </p:childTnLst>
+              </p:cTn>
+              <p:prevCondLst>
+                <p:cond evt="onPrev" delay="0">
+                  <p:tgtEl>
+                    <p:sldTgt/>
+                  </p:tgtEl>
+                </p:cond>
+              </p:prevCondLst>
+              <p:nextCondLst>
+                <p:cond evt="onNext" delay="0">
+                  <p:tgtEl>
+                    <p:sldTgt/>
+                  </p:tgtEl>
+                </p:cond>
+              </p:nextCondLst>
+            </p:seq>
+          </p:childTnLst>
+        </p:cTn>
+      </p:par>
+    </p:tnLst>
+    <p:bldLst>
+      <p:bldP spid="2" grpId="0" animBg="1"/>
+      <p:bldP spid="6" grpId="0" animBg="1"/>
+      <p:bldP spid="7" grpId="0" animBg="1"/>
+    </p:bldLst>
+  </p:timing>
+</p:sld>
+</file>
+
+<file path=ppt/slides/slide7.xml><?xml version="1.0" encoding="utf-8"?>
+<p:sld xmlns:a="http://schemas.openxmlformats.org/drawingml/2006/main" xmlns:r="http://schemas.openxmlformats.org/officeDocument/2006/relationships" xmlns:p="http://schemas.openxmlformats.org/presentationml/2006/main">
+  <p:cSld>
+    <p:spTree>
+      <p:nvGrpSpPr>
+        <p:cNvPr id="1" name=""/>
+        <p:cNvGrpSpPr/>
+        <p:nvPr/>
+      </p:nvGrpSpPr>
+      <p:grpSpPr>
+        <a:xfrm>
+          <a:off x="0" y="0"/>
+          <a:ext cx="0" cy="0"/>
+          <a:chOff x="0" y="0"/>
+          <a:chExt cx="0" cy="0"/>
+        </a:xfrm>
+      </p:grpSpPr>
+      <p:sp>
+        <p:nvSpPr>
+          <p:cNvPr id="5" name="TextBox 1">
+            <a:extLst>
+              <a:ext uri="{FF2B5EF4-FFF2-40B4-BE49-F238E27FC236}">
+                <a16:creationId xmlns:a16="http://schemas.microsoft.com/office/drawing/2014/main" id="{5080A0D0-CC8F-4CB8-8197-2F50804F40F7}"/>
+              </a:ext>
+            </a:extLst>
+          </p:cNvPr>
+          <p:cNvSpPr txBox="1"/>
+          <p:nvPr/>
+        </p:nvSpPr>
+        <p:spPr>
+          <a:xfrm>
+            <a:off x="5300136" y="130310"/>
+            <a:ext cx="3332727" cy="461665"/>
+          </a:xfrm>
+          <a:prstGeom prst="rect">
+            <a:avLst/>
+          </a:prstGeom>
+          <a:noFill/>
+        </p:spPr>
+        <p:txBody>
+          <a:bodyPr rot="0" spcFirstLastPara="0" vert="horz" wrap="square" lIns="91440" tIns="45720" rIns="91440" bIns="45720" numCol="1" spcCol="0" rtlCol="0" fromWordArt="0" anchor="t" anchorCtr="0" forceAA="0" compatLnSpc="1">
+            <a:prstTxWarp prst="textNoShape">
+              <a:avLst/>
+            </a:prstTxWarp>
+            <a:spAutoFit/>
+          </a:bodyPr>
+          <a:lstStyle>
+            <a:defPPr>
+              <a:defRPr lang="ru-RU"/>
+            </a:defPPr>
+            <a:lvl1pPr marL="0" algn="l" defTabSz="914400" rtl="0" eaLnBrk="1" latinLnBrk="0" hangingPunct="1">
+              <a:defRPr sz="1800" kern="1200">
+                <a:solidFill>
+                  <a:schemeClr val="tx1"/>
+                </a:solidFill>
+                <a:latin typeface="+mn-lt"/>
+                <a:ea typeface="+mn-ea"/>
+                <a:cs typeface="+mn-cs"/>
+              </a:defRPr>
+            </a:lvl1pPr>
+            <a:lvl2pPr marL="457200" algn="l" defTabSz="914400" rtl="0" eaLnBrk="1" latinLnBrk="0" hangingPunct="1">
+              <a:defRPr sz="1800" kern="1200">
+                <a:solidFill>
+                  <a:schemeClr val="tx1"/>
+                </a:solidFill>
+                <a:latin typeface="+mn-lt"/>
+                <a:ea typeface="+mn-ea"/>
+                <a:cs typeface="+mn-cs"/>
+              </a:defRPr>
+            </a:lvl2pPr>
+            <a:lvl3pPr marL="914400" algn="l" defTabSz="914400" rtl="0" eaLnBrk="1" latinLnBrk="0" hangingPunct="1">
+              <a:defRPr sz="1800" kern="1200">
+                <a:solidFill>
+                  <a:schemeClr val="tx1"/>
+                </a:solidFill>
+                <a:latin typeface="+mn-lt"/>
+                <a:ea typeface="+mn-ea"/>
+                <a:cs typeface="+mn-cs"/>
+              </a:defRPr>
+            </a:lvl3pPr>
+            <a:lvl4pPr marL="1371600" algn="l" defTabSz="914400" rtl="0" eaLnBrk="1" latinLnBrk="0" hangingPunct="1">
+              <a:defRPr sz="1800" kern="1200">
+                <a:solidFill>
+                  <a:schemeClr val="tx1"/>
+                </a:solidFill>
+                <a:latin typeface="+mn-lt"/>
+                <a:ea typeface="+mn-ea"/>
+                <a:cs typeface="+mn-cs"/>
+              </a:defRPr>
+            </a:lvl4pPr>
+            <a:lvl5pPr marL="1828800" algn="l" defTabSz="914400" rtl="0" eaLnBrk="1" latinLnBrk="0" hangingPunct="1">
+              <a:defRPr sz="1800" kern="1200">
+                <a:solidFill>
+                  <a:schemeClr val="tx1"/>
+                </a:solidFill>
+                <a:latin typeface="+mn-lt"/>
+                <a:ea typeface="+mn-ea"/>
+                <a:cs typeface="+mn-cs"/>
+              </a:defRPr>
+            </a:lvl5pPr>
+            <a:lvl6pPr marL="2286000" algn="l" defTabSz="914400" rtl="0" eaLnBrk="1" latinLnBrk="0" hangingPunct="1">
+              <a:defRPr sz="1800" kern="1200">
+                <a:solidFill>
+                  <a:schemeClr val="tx1"/>
+                </a:solidFill>
+                <a:latin typeface="+mn-lt"/>
+                <a:ea typeface="+mn-ea"/>
+                <a:cs typeface="+mn-cs"/>
+              </a:defRPr>
+            </a:lvl6pPr>
+            <a:lvl7pPr marL="2743200" algn="l" defTabSz="914400" rtl="0" eaLnBrk="1" latinLnBrk="0" hangingPunct="1">
+              <a:defRPr sz="1800" kern="1200">
+                <a:solidFill>
+                  <a:schemeClr val="tx1"/>
+                </a:solidFill>
+                <a:latin typeface="+mn-lt"/>
+                <a:ea typeface="+mn-ea"/>
+                <a:cs typeface="+mn-cs"/>
+              </a:defRPr>
+            </a:lvl7pPr>
+            <a:lvl8pPr marL="3200400" algn="l" defTabSz="914400" rtl="0" eaLnBrk="1" latinLnBrk="0" hangingPunct="1">
+              <a:defRPr sz="1800" kern="1200">
+                <a:solidFill>
+                  <a:schemeClr val="tx1"/>
+                </a:solidFill>
+                <a:latin typeface="+mn-lt"/>
+                <a:ea typeface="+mn-ea"/>
+                <a:cs typeface="+mn-cs"/>
+              </a:defRPr>
+            </a:lvl8pPr>
+            <a:lvl9pPr marL="3657600" algn="l" defTabSz="914400" rtl="0" eaLnBrk="1" latinLnBrk="0" hangingPunct="1">
+              <a:defRPr sz="1800" kern="1200">
+                <a:solidFill>
+                  <a:schemeClr val="tx1"/>
+                </a:solidFill>
+                <a:latin typeface="+mn-lt"/>
+                <a:ea typeface="+mn-ea"/>
+                <a:cs typeface="+mn-cs"/>
+              </a:defRPr>
+            </a:lvl9pPr>
+          </a:lstStyle>
+          <a:p>
+            <a:r>
+              <a:rPr lang="en-US" sz="2400" b="1" dirty="0" err="1">
+                <a:cs typeface="Calibri"/>
+              </a:rPr>
               <a:t>Словарь</a:t>
             </a:r>
             <a:endParaRPr lang="en-US" dirty="0" err="1"/>
@@ -16479,1804 +18277,6 @@
       <p:bldP spid="35" grpId="0" animBg="1"/>
       <p:bldP spid="36" grpId="0"/>
       <p:bldP spid="11" grpId="0"/>
-    </p:bldLst>
-  </p:timing>
-</p:sld>
-</file>
-
-<file path=ppt/slides/slide6.xml><?xml version="1.0" encoding="utf-8"?>
-<p:sld xmlns:a="http://schemas.openxmlformats.org/drawingml/2006/main" xmlns:r="http://schemas.openxmlformats.org/officeDocument/2006/relationships" xmlns:p="http://schemas.openxmlformats.org/presentationml/2006/main">
-  <p:cSld>
-    <p:spTree>
-      <p:nvGrpSpPr>
-        <p:cNvPr id="1" name=""/>
-        <p:cNvGrpSpPr/>
-        <p:nvPr/>
-      </p:nvGrpSpPr>
-      <p:grpSpPr>
-        <a:xfrm>
-          <a:off x="0" y="0"/>
-          <a:ext cx="0" cy="0"/>
-          <a:chOff x="0" y="0"/>
-          <a:chExt cx="0" cy="0"/>
-        </a:xfrm>
-      </p:grpSpPr>
-      <p:sp>
-        <p:nvSpPr>
-          <p:cNvPr id="5" name="TextBox 1">
-            <a:extLst>
-              <a:ext uri="{FF2B5EF4-FFF2-40B4-BE49-F238E27FC236}">
-                <a16:creationId xmlns:a16="http://schemas.microsoft.com/office/drawing/2014/main" id="{5080A0D0-CC8F-4CB8-8197-2F50804F40F7}"/>
-              </a:ext>
-            </a:extLst>
-          </p:cNvPr>
-          <p:cNvSpPr txBox="1"/>
-          <p:nvPr/>
-        </p:nvSpPr>
-        <p:spPr>
-          <a:xfrm>
-            <a:off x="5300136" y="130310"/>
-            <a:ext cx="3332727" cy="461665"/>
-          </a:xfrm>
-          <a:prstGeom prst="rect">
-            <a:avLst/>
-          </a:prstGeom>
-          <a:noFill/>
-        </p:spPr>
-        <p:txBody>
-          <a:bodyPr rot="0" spcFirstLastPara="0" vert="horz" wrap="square" lIns="91440" tIns="45720" rIns="91440" bIns="45720" numCol="1" spcCol="0" rtlCol="0" fromWordArt="0" anchor="t" anchorCtr="0" forceAA="0" compatLnSpc="1">
-            <a:prstTxWarp prst="textNoShape">
-              <a:avLst/>
-            </a:prstTxWarp>
-            <a:spAutoFit/>
-          </a:bodyPr>
-          <a:lstStyle>
-            <a:defPPr>
-              <a:defRPr lang="ru-RU"/>
-            </a:defPPr>
-            <a:lvl1pPr marL="0" algn="l" defTabSz="914400" rtl="0" eaLnBrk="1" latinLnBrk="0" hangingPunct="1">
-              <a:defRPr sz="1800" kern="1200">
-                <a:solidFill>
-                  <a:schemeClr val="tx1"/>
-                </a:solidFill>
-                <a:latin typeface="+mn-lt"/>
-                <a:ea typeface="+mn-ea"/>
-                <a:cs typeface="+mn-cs"/>
-              </a:defRPr>
-            </a:lvl1pPr>
-            <a:lvl2pPr marL="457200" algn="l" defTabSz="914400" rtl="0" eaLnBrk="1" latinLnBrk="0" hangingPunct="1">
-              <a:defRPr sz="1800" kern="1200">
-                <a:solidFill>
-                  <a:schemeClr val="tx1"/>
-                </a:solidFill>
-                <a:latin typeface="+mn-lt"/>
-                <a:ea typeface="+mn-ea"/>
-                <a:cs typeface="+mn-cs"/>
-              </a:defRPr>
-            </a:lvl2pPr>
-            <a:lvl3pPr marL="914400" algn="l" defTabSz="914400" rtl="0" eaLnBrk="1" latinLnBrk="0" hangingPunct="1">
-              <a:defRPr sz="1800" kern="1200">
-                <a:solidFill>
-                  <a:schemeClr val="tx1"/>
-                </a:solidFill>
-                <a:latin typeface="+mn-lt"/>
-                <a:ea typeface="+mn-ea"/>
-                <a:cs typeface="+mn-cs"/>
-              </a:defRPr>
-            </a:lvl3pPr>
-            <a:lvl4pPr marL="1371600" algn="l" defTabSz="914400" rtl="0" eaLnBrk="1" latinLnBrk="0" hangingPunct="1">
-              <a:defRPr sz="1800" kern="1200">
-                <a:solidFill>
-                  <a:schemeClr val="tx1"/>
-                </a:solidFill>
-                <a:latin typeface="+mn-lt"/>
-                <a:ea typeface="+mn-ea"/>
-                <a:cs typeface="+mn-cs"/>
-              </a:defRPr>
-            </a:lvl4pPr>
-            <a:lvl5pPr marL="1828800" algn="l" defTabSz="914400" rtl="0" eaLnBrk="1" latinLnBrk="0" hangingPunct="1">
-              <a:defRPr sz="1800" kern="1200">
-                <a:solidFill>
-                  <a:schemeClr val="tx1"/>
-                </a:solidFill>
-                <a:latin typeface="+mn-lt"/>
-                <a:ea typeface="+mn-ea"/>
-                <a:cs typeface="+mn-cs"/>
-              </a:defRPr>
-            </a:lvl5pPr>
-            <a:lvl6pPr marL="2286000" algn="l" defTabSz="914400" rtl="0" eaLnBrk="1" latinLnBrk="0" hangingPunct="1">
-              <a:defRPr sz="1800" kern="1200">
-                <a:solidFill>
-                  <a:schemeClr val="tx1"/>
-                </a:solidFill>
-                <a:latin typeface="+mn-lt"/>
-                <a:ea typeface="+mn-ea"/>
-                <a:cs typeface="+mn-cs"/>
-              </a:defRPr>
-            </a:lvl6pPr>
-            <a:lvl7pPr marL="2743200" algn="l" defTabSz="914400" rtl="0" eaLnBrk="1" latinLnBrk="0" hangingPunct="1">
-              <a:defRPr sz="1800" kern="1200">
-                <a:solidFill>
-                  <a:schemeClr val="tx1"/>
-                </a:solidFill>
-                <a:latin typeface="+mn-lt"/>
-                <a:ea typeface="+mn-ea"/>
-                <a:cs typeface="+mn-cs"/>
-              </a:defRPr>
-            </a:lvl7pPr>
-            <a:lvl8pPr marL="3200400" algn="l" defTabSz="914400" rtl="0" eaLnBrk="1" latinLnBrk="0" hangingPunct="1">
-              <a:defRPr sz="1800" kern="1200">
-                <a:solidFill>
-                  <a:schemeClr val="tx1"/>
-                </a:solidFill>
-                <a:latin typeface="+mn-lt"/>
-                <a:ea typeface="+mn-ea"/>
-                <a:cs typeface="+mn-cs"/>
-              </a:defRPr>
-            </a:lvl8pPr>
-            <a:lvl9pPr marL="3657600" algn="l" defTabSz="914400" rtl="0" eaLnBrk="1" latinLnBrk="0" hangingPunct="1">
-              <a:defRPr sz="1800" kern="1200">
-                <a:solidFill>
-                  <a:schemeClr val="tx1"/>
-                </a:solidFill>
-                <a:latin typeface="+mn-lt"/>
-                <a:ea typeface="+mn-ea"/>
-                <a:cs typeface="+mn-cs"/>
-              </a:defRPr>
-            </a:lvl9pPr>
-          </a:lstStyle>
-          <a:p>
-            <a:r>
-              <a:rPr lang="en-US" sz="2400" b="1" dirty="0" err="1">
-                <a:cs typeface="Calibri"/>
-              </a:rPr>
-              <a:t>Кортеж</a:t>
-            </a:r>
-            <a:endParaRPr lang="en-US" dirty="0" err="1"/>
-          </a:p>
-        </p:txBody>
-      </p:sp>
-      <p:sp>
-        <p:nvSpPr>
-          <p:cNvPr id="4" name="TextBox 3">
-            <a:extLst>
-              <a:ext uri="{FF2B5EF4-FFF2-40B4-BE49-F238E27FC236}">
-                <a16:creationId xmlns:a16="http://schemas.microsoft.com/office/drawing/2014/main" id="{7975019D-68F9-4491-8ACA-091B8AB3002E}"/>
-              </a:ext>
-            </a:extLst>
-          </p:cNvPr>
-          <p:cNvSpPr txBox="1"/>
-          <p:nvPr/>
-        </p:nvSpPr>
-        <p:spPr>
-          <a:xfrm>
-            <a:off x="1253427" y="5274129"/>
-            <a:ext cx="9006154" cy="1200329"/>
-          </a:xfrm>
-          <a:prstGeom prst="rect">
-            <a:avLst/>
-          </a:prstGeom>
-          <a:noFill/>
-        </p:spPr>
-        <p:txBody>
-          <a:bodyPr rot="0" spcFirstLastPara="0" vertOverflow="overflow" horzOverflow="overflow" vert="horz" wrap="square" lIns="91440" tIns="45720" rIns="91440" bIns="45720" numCol="1" spcCol="0" rtlCol="0" fromWordArt="0" anchor="t" anchorCtr="0" forceAA="0" compatLnSpc="1">
-            <a:prstTxWarp prst="textNoShape">
-              <a:avLst/>
-            </a:prstTxWarp>
-            <a:spAutoFit/>
-          </a:bodyPr>
-          <a:lstStyle/>
-          <a:p>
-            <a:r>
-              <a:rPr lang="en-US" b="1" dirty="0" err="1">
-                <a:solidFill>
-                  <a:srgbClr val="FF6C3A"/>
-                </a:solidFill>
-                <a:ea typeface="+mn-lt"/>
-                <a:cs typeface="+mn-lt"/>
-              </a:rPr>
-              <a:t>Кортежи</a:t>
-            </a:r>
-            <a:r>
-              <a:rPr lang="en-US" b="1" dirty="0">
-                <a:solidFill>
-                  <a:srgbClr val="FF6C3A"/>
-                </a:solidFill>
-                <a:ea typeface="+mn-lt"/>
-                <a:cs typeface="+mn-lt"/>
-              </a:rPr>
-              <a:t> </a:t>
-            </a:r>
-            <a:r>
-              <a:rPr lang="en-US" dirty="0" err="1">
-                <a:ea typeface="+mn-lt"/>
-                <a:cs typeface="+mn-lt"/>
-              </a:rPr>
-              <a:t>служат</a:t>
-            </a:r>
-            <a:r>
-              <a:rPr lang="en-US" dirty="0">
-                <a:ea typeface="+mn-lt"/>
-                <a:cs typeface="+mn-lt"/>
-              </a:rPr>
-              <a:t> </a:t>
-            </a:r>
-            <a:r>
-              <a:rPr lang="en-US" dirty="0" err="1">
-                <a:ea typeface="+mn-lt"/>
-                <a:cs typeface="+mn-lt"/>
-              </a:rPr>
-              <a:t>для</a:t>
-            </a:r>
-            <a:r>
-              <a:rPr lang="en-US" dirty="0">
-                <a:ea typeface="+mn-lt"/>
-                <a:cs typeface="+mn-lt"/>
-              </a:rPr>
-              <a:t> </a:t>
-            </a:r>
-            <a:r>
-              <a:rPr lang="en-US" dirty="0" err="1">
-                <a:ea typeface="+mn-lt"/>
-                <a:cs typeface="+mn-lt"/>
-              </a:rPr>
-              <a:t>хранения</a:t>
-            </a:r>
-            <a:r>
-              <a:rPr lang="en-US" dirty="0">
-                <a:ea typeface="+mn-lt"/>
-                <a:cs typeface="+mn-lt"/>
-              </a:rPr>
-              <a:t> </a:t>
-            </a:r>
-            <a:r>
-              <a:rPr lang="en-US" dirty="0" err="1">
-                <a:ea typeface="+mn-lt"/>
-                <a:cs typeface="+mn-lt"/>
-              </a:rPr>
-              <a:t>нескольких</a:t>
-            </a:r>
-            <a:r>
-              <a:rPr lang="en-US" dirty="0">
-                <a:ea typeface="+mn-lt"/>
-                <a:cs typeface="+mn-lt"/>
-              </a:rPr>
-              <a:t> </a:t>
-            </a:r>
-            <a:r>
-              <a:rPr lang="en-US" dirty="0" err="1">
-                <a:ea typeface="+mn-lt"/>
-                <a:cs typeface="+mn-lt"/>
-              </a:rPr>
-              <a:t>объектов</a:t>
-            </a:r>
-            <a:r>
-              <a:rPr lang="en-US" dirty="0">
-                <a:ea typeface="+mn-lt"/>
-                <a:cs typeface="+mn-lt"/>
-              </a:rPr>
-              <a:t> </a:t>
-            </a:r>
-            <a:r>
-              <a:rPr lang="en-US" dirty="0" err="1">
-                <a:ea typeface="+mn-lt"/>
-                <a:cs typeface="+mn-lt"/>
-              </a:rPr>
-              <a:t>вместе</a:t>
-            </a:r>
-            <a:r>
-              <a:rPr lang="en-US" dirty="0">
-                <a:ea typeface="+mn-lt"/>
-                <a:cs typeface="+mn-lt"/>
-              </a:rPr>
-              <a:t>. </a:t>
-            </a:r>
-            <a:r>
-              <a:rPr lang="en-US" dirty="0" err="1">
-                <a:ea typeface="+mn-lt"/>
-                <a:cs typeface="+mn-lt"/>
-              </a:rPr>
-              <a:t>Одна</a:t>
-            </a:r>
-            <a:r>
-              <a:rPr lang="en-US" dirty="0">
-                <a:ea typeface="+mn-lt"/>
-                <a:cs typeface="+mn-lt"/>
-              </a:rPr>
-              <a:t> </a:t>
-            </a:r>
-            <a:r>
-              <a:rPr lang="en-US" dirty="0" err="1">
-                <a:ea typeface="+mn-lt"/>
-                <a:cs typeface="+mn-lt"/>
-              </a:rPr>
-              <a:t>из</a:t>
-            </a:r>
-            <a:r>
-              <a:rPr lang="en-US" dirty="0">
-                <a:ea typeface="+mn-lt"/>
-                <a:cs typeface="+mn-lt"/>
-              </a:rPr>
-              <a:t> </a:t>
-            </a:r>
-            <a:r>
-              <a:rPr lang="en-US" dirty="0" err="1">
-                <a:ea typeface="+mn-lt"/>
-                <a:cs typeface="+mn-lt"/>
-              </a:rPr>
-              <a:t>важнейших</a:t>
-            </a:r>
-            <a:r>
-              <a:rPr lang="en-US" dirty="0">
-                <a:ea typeface="+mn-lt"/>
-                <a:cs typeface="+mn-lt"/>
-              </a:rPr>
-              <a:t> </a:t>
-            </a:r>
-            <a:r>
-              <a:rPr lang="en-US" dirty="0" err="1">
-                <a:ea typeface="+mn-lt"/>
-                <a:cs typeface="+mn-lt"/>
-              </a:rPr>
-              <a:t>особенностей</a:t>
-            </a:r>
-            <a:r>
-              <a:rPr lang="en-US" dirty="0">
-                <a:ea typeface="+mn-lt"/>
-                <a:cs typeface="+mn-lt"/>
-              </a:rPr>
-              <a:t> </a:t>
-            </a:r>
-            <a:r>
-              <a:rPr lang="en-US" dirty="0" err="1">
-                <a:ea typeface="+mn-lt"/>
-                <a:cs typeface="+mn-lt"/>
-              </a:rPr>
-              <a:t>кортежей</a:t>
-            </a:r>
-            <a:r>
-              <a:rPr lang="en-US" dirty="0">
-                <a:ea typeface="+mn-lt"/>
-                <a:cs typeface="+mn-lt"/>
-              </a:rPr>
-              <a:t> </a:t>
-            </a:r>
-            <a:r>
-              <a:rPr lang="en-US" dirty="0" err="1">
-                <a:ea typeface="+mn-lt"/>
-                <a:cs typeface="+mn-lt"/>
-              </a:rPr>
-              <a:t>заключается</a:t>
-            </a:r>
-            <a:r>
-              <a:rPr lang="en-US" dirty="0">
-                <a:ea typeface="+mn-lt"/>
-                <a:cs typeface="+mn-lt"/>
-              </a:rPr>
-              <a:t> в </a:t>
-            </a:r>
-            <a:r>
-              <a:rPr lang="en-US" dirty="0" err="1">
-                <a:ea typeface="+mn-lt"/>
-                <a:cs typeface="+mn-lt"/>
-              </a:rPr>
-              <a:t>том</a:t>
-            </a:r>
-            <a:r>
-              <a:rPr lang="en-US" dirty="0">
-                <a:ea typeface="+mn-lt"/>
-                <a:cs typeface="+mn-lt"/>
-              </a:rPr>
-              <a:t>, </a:t>
-            </a:r>
-            <a:r>
-              <a:rPr lang="en-US" dirty="0" err="1">
-                <a:ea typeface="+mn-lt"/>
-                <a:cs typeface="+mn-lt"/>
-              </a:rPr>
-              <a:t>что</a:t>
-            </a:r>
-            <a:r>
-              <a:rPr lang="en-US" dirty="0">
-                <a:ea typeface="+mn-lt"/>
-                <a:cs typeface="+mn-lt"/>
-              </a:rPr>
-              <a:t> </a:t>
-            </a:r>
-            <a:r>
-              <a:rPr lang="en-US" dirty="0" err="1">
-                <a:ea typeface="+mn-lt"/>
-                <a:cs typeface="+mn-lt"/>
-              </a:rPr>
-              <a:t>они</a:t>
-            </a:r>
-            <a:r>
-              <a:rPr lang="en-US" dirty="0">
-                <a:ea typeface="+mn-lt"/>
-                <a:cs typeface="+mn-lt"/>
-              </a:rPr>
-              <a:t> </a:t>
-            </a:r>
-            <a:r>
-              <a:rPr lang="en-US" b="1" dirty="0" err="1">
-                <a:solidFill>
-                  <a:srgbClr val="FF6C3A"/>
-                </a:solidFill>
-                <a:ea typeface="+mn-lt"/>
-                <a:cs typeface="+mn-lt"/>
-              </a:rPr>
-              <a:t>неизменяемы</a:t>
-            </a:r>
-            <a:r>
-              <a:rPr lang="en-US" dirty="0">
-                <a:ea typeface="+mn-lt"/>
-                <a:cs typeface="+mn-lt"/>
-              </a:rPr>
-              <a:t>, </a:t>
-            </a:r>
-            <a:r>
-              <a:rPr lang="en-US" dirty="0" err="1">
-                <a:ea typeface="+mn-lt"/>
-                <a:cs typeface="+mn-lt"/>
-              </a:rPr>
-              <a:t>так</a:t>
-            </a:r>
-            <a:r>
-              <a:rPr lang="en-US" dirty="0">
-                <a:ea typeface="+mn-lt"/>
-                <a:cs typeface="+mn-lt"/>
-              </a:rPr>
-              <a:t> </a:t>
-            </a:r>
-            <a:r>
-              <a:rPr lang="en-US" dirty="0" err="1">
-                <a:ea typeface="+mn-lt"/>
-                <a:cs typeface="+mn-lt"/>
-              </a:rPr>
-              <a:t>же</a:t>
-            </a:r>
-            <a:r>
-              <a:rPr lang="en-US" dirty="0">
-                <a:ea typeface="+mn-lt"/>
-                <a:cs typeface="+mn-lt"/>
-              </a:rPr>
-              <a:t>, </a:t>
-            </a:r>
-            <a:r>
-              <a:rPr lang="en-US" dirty="0" err="1">
-                <a:ea typeface="+mn-lt"/>
-                <a:cs typeface="+mn-lt"/>
-              </a:rPr>
-              <a:t>как</a:t>
-            </a:r>
-            <a:r>
-              <a:rPr lang="en-US" dirty="0">
-                <a:ea typeface="+mn-lt"/>
-                <a:cs typeface="+mn-lt"/>
-              </a:rPr>
-              <a:t> и </a:t>
-            </a:r>
-            <a:r>
-              <a:rPr lang="en-US" dirty="0" err="1">
-                <a:ea typeface="+mn-lt"/>
-                <a:cs typeface="+mn-lt"/>
-              </a:rPr>
-              <a:t>строки</a:t>
-            </a:r>
-            <a:r>
-              <a:rPr lang="en-US" dirty="0">
-                <a:ea typeface="+mn-lt"/>
-                <a:cs typeface="+mn-lt"/>
-              </a:rPr>
-              <a:t>. </a:t>
-            </a:r>
-            <a:r>
-              <a:rPr lang="en-US" dirty="0" err="1">
-                <a:ea typeface="+mn-lt"/>
-                <a:cs typeface="+mn-lt"/>
-              </a:rPr>
-              <a:t>Т.е</a:t>
-            </a:r>
-            <a:r>
-              <a:rPr lang="en-US" dirty="0">
-                <a:ea typeface="+mn-lt"/>
-                <a:cs typeface="+mn-lt"/>
-              </a:rPr>
-              <a:t>. </a:t>
-            </a:r>
-            <a:r>
-              <a:rPr lang="en-US" dirty="0" err="1">
-                <a:ea typeface="+mn-lt"/>
-                <a:cs typeface="+mn-lt"/>
-              </a:rPr>
-              <a:t>модифицировать</a:t>
-            </a:r>
-            <a:r>
-              <a:rPr lang="en-US" dirty="0">
-                <a:ea typeface="+mn-lt"/>
-                <a:cs typeface="+mn-lt"/>
-              </a:rPr>
-              <a:t> </a:t>
-            </a:r>
-            <a:r>
-              <a:rPr lang="en-US" dirty="0" err="1">
-                <a:ea typeface="+mn-lt"/>
-                <a:cs typeface="+mn-lt"/>
-              </a:rPr>
-              <a:t>кортежи</a:t>
-            </a:r>
-            <a:r>
-              <a:rPr lang="en-US" dirty="0">
-                <a:ea typeface="+mn-lt"/>
-                <a:cs typeface="+mn-lt"/>
-              </a:rPr>
-              <a:t> </a:t>
-            </a:r>
-            <a:r>
-              <a:rPr lang="en-US" dirty="0" err="1">
-                <a:ea typeface="+mn-lt"/>
-                <a:cs typeface="+mn-lt"/>
-              </a:rPr>
-              <a:t>невозможно</a:t>
-            </a:r>
-            <a:r>
-              <a:rPr lang="en-US" dirty="0">
-                <a:ea typeface="+mn-lt"/>
-                <a:cs typeface="+mn-lt"/>
-              </a:rPr>
-              <a:t>.</a:t>
-            </a:r>
-            <a:br>
-              <a:rPr lang="en-US" dirty="0"/>
-            </a:br>
-            <a:endParaRPr lang="en-US">
-              <a:cs typeface="Calibri"/>
-            </a:endParaRPr>
-          </a:p>
-        </p:txBody>
-      </p:sp>
-      <p:pic>
-        <p:nvPicPr>
-          <p:cNvPr id="3" name="Picture 5">
-            <a:extLst>
-              <a:ext uri="{FF2B5EF4-FFF2-40B4-BE49-F238E27FC236}">
-                <a16:creationId xmlns:a16="http://schemas.microsoft.com/office/drawing/2014/main" id="{42EA3EC2-6CAD-420F-AFF8-FABA3E17C966}"/>
-              </a:ext>
-            </a:extLst>
-          </p:cNvPr>
-          <p:cNvPicPr>
-            <a:picLocks noChangeAspect="1"/>
-          </p:cNvPicPr>
-          <p:nvPr/>
-        </p:nvPicPr>
-        <p:blipFill>
-          <a:blip r:embed="rId2"/>
-          <a:stretch>
-            <a:fillRect/>
-          </a:stretch>
-        </p:blipFill>
-        <p:spPr>
-          <a:xfrm>
-            <a:off x="3442010" y="1282158"/>
-            <a:ext cx="5094248" cy="2862610"/>
-          </a:xfrm>
-          <a:prstGeom prst="rect">
-            <a:avLst/>
-          </a:prstGeom>
-        </p:spPr>
-      </p:pic>
-    </p:spTree>
-    <p:extLst>
-      <p:ext uri="{BB962C8B-B14F-4D97-AF65-F5344CB8AC3E}">
-        <p14:creationId xmlns:p14="http://schemas.microsoft.com/office/powerpoint/2010/main" val="2884253150"/>
-      </p:ext>
-    </p:extLst>
-  </p:cSld>
-  <p:clrMapOvr>
-    <a:masterClrMapping/>
-  </p:clrMapOvr>
-</p:sld>
-</file>
-
-<file path=ppt/slides/slide7.xml><?xml version="1.0" encoding="utf-8"?>
-<p:sld xmlns:a="http://schemas.openxmlformats.org/drawingml/2006/main" xmlns:r="http://schemas.openxmlformats.org/officeDocument/2006/relationships" xmlns:p="http://schemas.openxmlformats.org/presentationml/2006/main">
-  <p:cSld>
-    <p:spTree>
-      <p:nvGrpSpPr>
-        <p:cNvPr id="1" name=""/>
-        <p:cNvGrpSpPr/>
-        <p:nvPr/>
-      </p:nvGrpSpPr>
-      <p:grpSpPr>
-        <a:xfrm>
-          <a:off x="0" y="0"/>
-          <a:ext cx="0" cy="0"/>
-          <a:chOff x="0" y="0"/>
-          <a:chExt cx="0" cy="0"/>
-        </a:xfrm>
-      </p:grpSpPr>
-      <p:sp>
-        <p:nvSpPr>
-          <p:cNvPr id="5" name="TextBox 1">
-            <a:extLst>
-              <a:ext uri="{FF2B5EF4-FFF2-40B4-BE49-F238E27FC236}">
-                <a16:creationId xmlns:a16="http://schemas.microsoft.com/office/drawing/2014/main" id="{5080A0D0-CC8F-4CB8-8197-2F50804F40F7}"/>
-              </a:ext>
-            </a:extLst>
-          </p:cNvPr>
-          <p:cNvSpPr txBox="1"/>
-          <p:nvPr/>
-        </p:nvSpPr>
-        <p:spPr>
-          <a:xfrm>
-            <a:off x="4677526" y="213944"/>
-            <a:ext cx="3332727" cy="461665"/>
-          </a:xfrm>
-          <a:prstGeom prst="rect">
-            <a:avLst/>
-          </a:prstGeom>
-          <a:noFill/>
-        </p:spPr>
-        <p:txBody>
-          <a:bodyPr rot="0" spcFirstLastPara="0" vert="horz" wrap="square" lIns="91440" tIns="45720" rIns="91440" bIns="45720" numCol="1" spcCol="0" rtlCol="0" fromWordArt="0" anchor="t" anchorCtr="0" forceAA="0" compatLnSpc="1">
-            <a:prstTxWarp prst="textNoShape">
-              <a:avLst/>
-            </a:prstTxWarp>
-            <a:spAutoFit/>
-          </a:bodyPr>
-          <a:lstStyle>
-            <a:defPPr>
-              <a:defRPr lang="ru-RU"/>
-            </a:defPPr>
-            <a:lvl1pPr marL="0" algn="l" defTabSz="914400" rtl="0" eaLnBrk="1" latinLnBrk="0" hangingPunct="1">
-              <a:defRPr sz="1800" kern="1200">
-                <a:solidFill>
-                  <a:schemeClr val="tx1"/>
-                </a:solidFill>
-                <a:latin typeface="+mn-lt"/>
-                <a:ea typeface="+mn-ea"/>
-                <a:cs typeface="+mn-cs"/>
-              </a:defRPr>
-            </a:lvl1pPr>
-            <a:lvl2pPr marL="457200" algn="l" defTabSz="914400" rtl="0" eaLnBrk="1" latinLnBrk="0" hangingPunct="1">
-              <a:defRPr sz="1800" kern="1200">
-                <a:solidFill>
-                  <a:schemeClr val="tx1"/>
-                </a:solidFill>
-                <a:latin typeface="+mn-lt"/>
-                <a:ea typeface="+mn-ea"/>
-                <a:cs typeface="+mn-cs"/>
-              </a:defRPr>
-            </a:lvl2pPr>
-            <a:lvl3pPr marL="914400" algn="l" defTabSz="914400" rtl="0" eaLnBrk="1" latinLnBrk="0" hangingPunct="1">
-              <a:defRPr sz="1800" kern="1200">
-                <a:solidFill>
-                  <a:schemeClr val="tx1"/>
-                </a:solidFill>
-                <a:latin typeface="+mn-lt"/>
-                <a:ea typeface="+mn-ea"/>
-                <a:cs typeface="+mn-cs"/>
-              </a:defRPr>
-            </a:lvl3pPr>
-            <a:lvl4pPr marL="1371600" algn="l" defTabSz="914400" rtl="0" eaLnBrk="1" latinLnBrk="0" hangingPunct="1">
-              <a:defRPr sz="1800" kern="1200">
-                <a:solidFill>
-                  <a:schemeClr val="tx1"/>
-                </a:solidFill>
-                <a:latin typeface="+mn-lt"/>
-                <a:ea typeface="+mn-ea"/>
-                <a:cs typeface="+mn-cs"/>
-              </a:defRPr>
-            </a:lvl4pPr>
-            <a:lvl5pPr marL="1828800" algn="l" defTabSz="914400" rtl="0" eaLnBrk="1" latinLnBrk="0" hangingPunct="1">
-              <a:defRPr sz="1800" kern="1200">
-                <a:solidFill>
-                  <a:schemeClr val="tx1"/>
-                </a:solidFill>
-                <a:latin typeface="+mn-lt"/>
-                <a:ea typeface="+mn-ea"/>
-                <a:cs typeface="+mn-cs"/>
-              </a:defRPr>
-            </a:lvl5pPr>
-            <a:lvl6pPr marL="2286000" algn="l" defTabSz="914400" rtl="0" eaLnBrk="1" latinLnBrk="0" hangingPunct="1">
-              <a:defRPr sz="1800" kern="1200">
-                <a:solidFill>
-                  <a:schemeClr val="tx1"/>
-                </a:solidFill>
-                <a:latin typeface="+mn-lt"/>
-                <a:ea typeface="+mn-ea"/>
-                <a:cs typeface="+mn-cs"/>
-              </a:defRPr>
-            </a:lvl6pPr>
-            <a:lvl7pPr marL="2743200" algn="l" defTabSz="914400" rtl="0" eaLnBrk="1" latinLnBrk="0" hangingPunct="1">
-              <a:defRPr sz="1800" kern="1200">
-                <a:solidFill>
-                  <a:schemeClr val="tx1"/>
-                </a:solidFill>
-                <a:latin typeface="+mn-lt"/>
-                <a:ea typeface="+mn-ea"/>
-                <a:cs typeface="+mn-cs"/>
-              </a:defRPr>
-            </a:lvl7pPr>
-            <a:lvl8pPr marL="3200400" algn="l" defTabSz="914400" rtl="0" eaLnBrk="1" latinLnBrk="0" hangingPunct="1">
-              <a:defRPr sz="1800" kern="1200">
-                <a:solidFill>
-                  <a:schemeClr val="tx1"/>
-                </a:solidFill>
-                <a:latin typeface="+mn-lt"/>
-                <a:ea typeface="+mn-ea"/>
-                <a:cs typeface="+mn-cs"/>
-              </a:defRPr>
-            </a:lvl8pPr>
-            <a:lvl9pPr marL="3657600" algn="l" defTabSz="914400" rtl="0" eaLnBrk="1" latinLnBrk="0" hangingPunct="1">
-              <a:defRPr sz="1800" kern="1200">
-                <a:solidFill>
-                  <a:schemeClr val="tx1"/>
-                </a:solidFill>
-                <a:latin typeface="+mn-lt"/>
-                <a:ea typeface="+mn-ea"/>
-                <a:cs typeface="+mn-cs"/>
-              </a:defRPr>
-            </a:lvl9pPr>
-          </a:lstStyle>
-          <a:p>
-            <a:r>
-              <a:rPr lang="en-US" sz="2400" b="1" dirty="0" err="1">
-                <a:cs typeface="Calibri"/>
-              </a:rPr>
-              <a:t>Последовательности</a:t>
-            </a:r>
-            <a:endParaRPr lang="en-US" dirty="0" err="1"/>
-          </a:p>
-        </p:txBody>
-      </p:sp>
-      <p:sp>
-        <p:nvSpPr>
-          <p:cNvPr id="4" name="TextBox 3">
-            <a:extLst>
-              <a:ext uri="{FF2B5EF4-FFF2-40B4-BE49-F238E27FC236}">
-                <a16:creationId xmlns:a16="http://schemas.microsoft.com/office/drawing/2014/main" id="{7975019D-68F9-4491-8ACA-091B8AB3002E}"/>
-              </a:ext>
-            </a:extLst>
-          </p:cNvPr>
-          <p:cNvSpPr txBox="1"/>
-          <p:nvPr/>
-        </p:nvSpPr>
-        <p:spPr>
-          <a:xfrm>
-            <a:off x="398500" y="5617957"/>
-            <a:ext cx="11292154" cy="923330"/>
-          </a:xfrm>
-          <a:prstGeom prst="rect">
-            <a:avLst/>
-          </a:prstGeom>
-          <a:noFill/>
-        </p:spPr>
-        <p:txBody>
-          <a:bodyPr rot="0" spcFirstLastPara="0" vertOverflow="overflow" horzOverflow="overflow" vert="horz" wrap="square" lIns="91440" tIns="45720" rIns="91440" bIns="45720" numCol="1" spcCol="0" rtlCol="0" fromWordArt="0" anchor="t" anchorCtr="0" forceAA="0" compatLnSpc="1">
-            <a:prstTxWarp prst="textNoShape">
-              <a:avLst/>
-            </a:prstTxWarp>
-            <a:spAutoFit/>
-          </a:bodyPr>
-          <a:lstStyle/>
-          <a:p>
-            <a:pPr algn="ctr"/>
-            <a:r>
-              <a:rPr lang="en-US" dirty="0">
-                <a:ea typeface="+mn-lt"/>
-                <a:cs typeface="+mn-lt"/>
-              </a:rPr>
-              <a:t> </a:t>
-            </a:r>
-            <a:r>
-              <a:rPr lang="en-US" err="1">
-                <a:ea typeface="+mn-lt"/>
-                <a:cs typeface="+mn-lt"/>
-              </a:rPr>
-              <a:t>Основные</a:t>
-            </a:r>
-            <a:r>
-              <a:rPr lang="en-US" dirty="0">
-                <a:ea typeface="+mn-lt"/>
-                <a:cs typeface="+mn-lt"/>
-              </a:rPr>
-              <a:t> </a:t>
-            </a:r>
-            <a:r>
-              <a:rPr lang="en-US" err="1">
-                <a:ea typeface="+mn-lt"/>
-                <a:cs typeface="+mn-lt"/>
-              </a:rPr>
-              <a:t>возможности</a:t>
-            </a:r>
-            <a:r>
-              <a:rPr lang="en-US" dirty="0">
-                <a:ea typeface="+mn-lt"/>
-                <a:cs typeface="+mn-lt"/>
-              </a:rPr>
-              <a:t> – </a:t>
-            </a:r>
-            <a:r>
-              <a:rPr lang="en-US" err="1">
-                <a:ea typeface="+mn-lt"/>
-                <a:cs typeface="+mn-lt"/>
-              </a:rPr>
-              <a:t>это</a:t>
-            </a:r>
-            <a:r>
-              <a:rPr lang="en-US" dirty="0">
-                <a:ea typeface="+mn-lt"/>
-                <a:cs typeface="+mn-lt"/>
-              </a:rPr>
-              <a:t> </a:t>
-            </a:r>
-            <a:r>
-              <a:rPr lang="en-US" b="1" err="1">
-                <a:solidFill>
-                  <a:srgbClr val="FF6C3A"/>
-                </a:solidFill>
-                <a:ea typeface="+mn-lt"/>
-                <a:cs typeface="+mn-lt"/>
-              </a:rPr>
-              <a:t>проверка</a:t>
-            </a:r>
-            <a:r>
-              <a:rPr lang="en-US" b="1" dirty="0">
-                <a:solidFill>
-                  <a:srgbClr val="FF6C3A"/>
-                </a:solidFill>
-                <a:ea typeface="+mn-lt"/>
-                <a:cs typeface="+mn-lt"/>
-              </a:rPr>
-              <a:t> </a:t>
-            </a:r>
-            <a:r>
-              <a:rPr lang="en-US" b="1" err="1">
-                <a:solidFill>
-                  <a:srgbClr val="FF6C3A"/>
-                </a:solidFill>
-                <a:ea typeface="+mn-lt"/>
-                <a:cs typeface="+mn-lt"/>
-              </a:rPr>
-              <a:t>принадлежности</a:t>
-            </a:r>
-            <a:r>
-              <a:rPr lang="en-US" b="1" dirty="0">
-                <a:solidFill>
-                  <a:srgbClr val="FF6C3A"/>
-                </a:solidFill>
-                <a:ea typeface="+mn-lt"/>
-                <a:cs typeface="+mn-lt"/>
-              </a:rPr>
-              <a:t> </a:t>
-            </a:r>
-            <a:r>
-              <a:rPr lang="en-US" dirty="0">
-                <a:ea typeface="+mn-lt"/>
-                <a:cs typeface="+mn-lt"/>
-              </a:rPr>
-              <a:t>(</a:t>
-            </a:r>
-            <a:r>
-              <a:rPr lang="en-US" err="1">
-                <a:ea typeface="+mn-lt"/>
-                <a:cs typeface="+mn-lt"/>
-              </a:rPr>
-              <a:t>т.е</a:t>
-            </a:r>
-            <a:r>
-              <a:rPr lang="en-US" dirty="0">
-                <a:ea typeface="+mn-lt"/>
-                <a:cs typeface="+mn-lt"/>
-              </a:rPr>
-              <a:t>. </a:t>
-            </a:r>
-            <a:r>
-              <a:rPr lang="en-US" err="1">
-                <a:ea typeface="+mn-lt"/>
-                <a:cs typeface="+mn-lt"/>
-              </a:rPr>
-              <a:t>выражения</a:t>
-            </a:r>
-            <a:r>
-              <a:rPr lang="en-US" dirty="0">
-                <a:ea typeface="+mn-lt"/>
-                <a:cs typeface="+mn-lt"/>
-              </a:rPr>
-              <a:t> « in » и « not</a:t>
-            </a:r>
-          </a:p>
-          <a:p>
-            <a:pPr algn="ctr"/>
-            <a:r>
-              <a:rPr lang="en-US" dirty="0">
-                <a:ea typeface="+mn-lt"/>
-                <a:cs typeface="+mn-lt"/>
-              </a:rPr>
-              <a:t>in ») и </a:t>
-            </a:r>
-            <a:r>
-              <a:rPr lang="en-US" b="1" dirty="0" err="1">
-                <a:solidFill>
-                  <a:srgbClr val="FF6C3A"/>
-                </a:solidFill>
-                <a:ea typeface="+mn-lt"/>
-                <a:cs typeface="+mn-lt"/>
-              </a:rPr>
-              <a:t>оператор</a:t>
-            </a:r>
-            <a:r>
-              <a:rPr lang="en-US" b="1" dirty="0">
-                <a:solidFill>
-                  <a:srgbClr val="FF6C3A"/>
-                </a:solidFill>
-                <a:ea typeface="+mn-lt"/>
-                <a:cs typeface="+mn-lt"/>
-              </a:rPr>
-              <a:t> </a:t>
-            </a:r>
-            <a:r>
-              <a:rPr lang="en-US" b="1" dirty="0" err="1">
-                <a:solidFill>
-                  <a:srgbClr val="FF6C3A"/>
-                </a:solidFill>
-                <a:ea typeface="+mn-lt"/>
-                <a:cs typeface="+mn-lt"/>
-              </a:rPr>
-              <a:t>индексирования</a:t>
-            </a:r>
-            <a:r>
-              <a:rPr lang="en-US" dirty="0">
-                <a:ea typeface="+mn-lt"/>
-                <a:cs typeface="+mn-lt"/>
-              </a:rPr>
-              <a:t>, </a:t>
-            </a:r>
-            <a:r>
-              <a:rPr lang="en-US" dirty="0" err="1">
-                <a:ea typeface="+mn-lt"/>
-                <a:cs typeface="+mn-lt"/>
-              </a:rPr>
-              <a:t>позволяющий</a:t>
-            </a:r>
-            <a:r>
-              <a:rPr lang="en-US" dirty="0">
-                <a:ea typeface="+mn-lt"/>
-                <a:cs typeface="+mn-lt"/>
-              </a:rPr>
-              <a:t> </a:t>
-            </a:r>
-            <a:r>
-              <a:rPr lang="en-US" dirty="0" err="1">
-                <a:ea typeface="+mn-lt"/>
-                <a:cs typeface="+mn-lt"/>
-              </a:rPr>
-              <a:t>получить</a:t>
-            </a:r>
-            <a:r>
-              <a:rPr lang="en-US" dirty="0">
-                <a:ea typeface="+mn-lt"/>
-                <a:cs typeface="+mn-lt"/>
-              </a:rPr>
-              <a:t> </a:t>
-            </a:r>
-            <a:r>
-              <a:rPr lang="en-US" dirty="0" err="1">
-                <a:ea typeface="+mn-lt"/>
-                <a:cs typeface="+mn-lt"/>
-              </a:rPr>
-              <a:t>напрямую</a:t>
-            </a:r>
-            <a:r>
-              <a:rPr lang="en-US" dirty="0">
-                <a:ea typeface="+mn-lt"/>
-                <a:cs typeface="+mn-lt"/>
-              </a:rPr>
-              <a:t> </a:t>
-            </a:r>
-            <a:r>
-              <a:rPr lang="en-US" dirty="0" err="1">
-                <a:ea typeface="+mn-lt"/>
-                <a:cs typeface="+mn-lt"/>
-              </a:rPr>
-              <a:t>некоторый</a:t>
-            </a:r>
-            <a:r>
-              <a:rPr lang="en-US" dirty="0">
-                <a:ea typeface="+mn-lt"/>
-                <a:cs typeface="+mn-lt"/>
-              </a:rPr>
-              <a:t> </a:t>
-            </a:r>
-            <a:r>
-              <a:rPr lang="en-US" dirty="0" err="1">
-                <a:ea typeface="+mn-lt"/>
-                <a:cs typeface="+mn-lt"/>
-              </a:rPr>
-              <a:t>элемент</a:t>
-            </a:r>
-            <a:r>
-              <a:rPr lang="en-US" dirty="0">
-                <a:ea typeface="+mn-lt"/>
-                <a:cs typeface="+mn-lt"/>
-              </a:rPr>
-              <a:t> </a:t>
-            </a:r>
-            <a:r>
-              <a:rPr lang="en-US" dirty="0" err="1">
-                <a:ea typeface="+mn-lt"/>
-                <a:cs typeface="+mn-lt"/>
-              </a:rPr>
-              <a:t>последовательности</a:t>
-            </a:r>
-            <a:r>
-              <a:rPr lang="en-US" dirty="0">
-                <a:ea typeface="+mn-lt"/>
-                <a:cs typeface="+mn-lt"/>
-              </a:rPr>
-              <a:t>.</a:t>
-            </a:r>
-            <a:br>
-              <a:rPr lang="en-US" dirty="0"/>
-            </a:br>
-            <a:endParaRPr lang="en-US">
-              <a:cs typeface="Calibri"/>
-            </a:endParaRPr>
-          </a:p>
-        </p:txBody>
-      </p:sp>
-      <p:sp>
-        <p:nvSpPr>
-          <p:cNvPr id="2" name="Oval 1">
-            <a:extLst>
-              <a:ext uri="{FF2B5EF4-FFF2-40B4-BE49-F238E27FC236}">
-                <a16:creationId xmlns:a16="http://schemas.microsoft.com/office/drawing/2014/main" id="{E4A32D74-1F11-4CF5-8F7D-3521A4272859}"/>
-              </a:ext>
-            </a:extLst>
-          </p:cNvPr>
-          <p:cNvSpPr/>
-          <p:nvPr/>
-        </p:nvSpPr>
-        <p:spPr>
-          <a:xfrm>
-            <a:off x="3594410" y="1419922"/>
-            <a:ext cx="1449657" cy="1347438"/>
-          </a:xfrm>
-          <a:prstGeom prst="ellipse">
-            <a:avLst/>
-          </a:prstGeom>
-          <a:solidFill>
-            <a:srgbClr val="FF6C3A"/>
-          </a:solidFill>
-        </p:spPr>
-        <p:style>
-          <a:lnRef idx="2">
-            <a:schemeClr val="accent1">
-              <a:shade val="50000"/>
-            </a:schemeClr>
-          </a:lnRef>
-          <a:fillRef idx="1">
-            <a:schemeClr val="accent1"/>
-          </a:fillRef>
-          <a:effectRef idx="0">
-            <a:schemeClr val="accent1"/>
-          </a:effectRef>
-          <a:fontRef idx="minor">
-            <a:schemeClr val="lt1"/>
-          </a:fontRef>
-        </p:style>
-        <p:txBody>
-          <a:bodyPr rtlCol="0" anchor="ctr"/>
-          <a:lstStyle/>
-          <a:p>
-            <a:pPr algn="ctr"/>
-            <a:r>
-              <a:rPr lang="en-US" b="1" dirty="0" err="1">
-                <a:cs typeface="Calibri"/>
-              </a:rPr>
-              <a:t>Cписки</a:t>
-            </a:r>
-            <a:endParaRPr lang="en-US" b="1" dirty="0" err="1"/>
-          </a:p>
-        </p:txBody>
-      </p:sp>
-      <p:sp>
-        <p:nvSpPr>
-          <p:cNvPr id="6" name="Oval 5">
-            <a:extLst>
-              <a:ext uri="{FF2B5EF4-FFF2-40B4-BE49-F238E27FC236}">
-                <a16:creationId xmlns:a16="http://schemas.microsoft.com/office/drawing/2014/main" id="{42661127-69F5-4881-8E64-68D9B1A21F91}"/>
-              </a:ext>
-            </a:extLst>
-          </p:cNvPr>
-          <p:cNvSpPr/>
-          <p:nvPr/>
-        </p:nvSpPr>
-        <p:spPr>
-          <a:xfrm>
-            <a:off x="5211337" y="1419922"/>
-            <a:ext cx="1505413" cy="1347438"/>
-          </a:xfrm>
-          <a:prstGeom prst="ellipse">
-            <a:avLst/>
-          </a:prstGeom>
-          <a:solidFill>
-            <a:srgbClr val="FF6C3A"/>
-          </a:solidFill>
-        </p:spPr>
-        <p:style>
-          <a:lnRef idx="2">
-            <a:schemeClr val="accent1">
-              <a:shade val="50000"/>
-            </a:schemeClr>
-          </a:lnRef>
-          <a:fillRef idx="1">
-            <a:schemeClr val="accent1"/>
-          </a:fillRef>
-          <a:effectRef idx="0">
-            <a:schemeClr val="accent1"/>
-          </a:effectRef>
-          <a:fontRef idx="minor">
-            <a:schemeClr val="lt1"/>
-          </a:fontRef>
-        </p:style>
-        <p:txBody>
-          <a:bodyPr lIns="91440" tIns="45720" rIns="91440" bIns="45720" rtlCol="0" anchor="ctr"/>
-          <a:lstStyle/>
-          <a:p>
-            <a:pPr algn="ctr"/>
-            <a:r>
-              <a:rPr lang="en-US" b="1" dirty="0" err="1">
-                <a:cs typeface="Calibri"/>
-              </a:rPr>
-              <a:t>Кортежи</a:t>
-            </a:r>
-            <a:endParaRPr lang="en-US" b="1" dirty="0" err="1"/>
-          </a:p>
-        </p:txBody>
-      </p:sp>
-      <p:sp>
-        <p:nvSpPr>
-          <p:cNvPr id="7" name="Oval 6">
-            <a:extLst>
-              <a:ext uri="{FF2B5EF4-FFF2-40B4-BE49-F238E27FC236}">
-                <a16:creationId xmlns:a16="http://schemas.microsoft.com/office/drawing/2014/main" id="{A2B0BE34-59FB-4ACC-B835-83FA46D93F71}"/>
-              </a:ext>
-            </a:extLst>
-          </p:cNvPr>
-          <p:cNvSpPr/>
-          <p:nvPr/>
-        </p:nvSpPr>
-        <p:spPr>
-          <a:xfrm>
-            <a:off x="6884019" y="1373459"/>
-            <a:ext cx="1449657" cy="1347438"/>
-          </a:xfrm>
-          <a:prstGeom prst="ellipse">
-            <a:avLst/>
-          </a:prstGeom>
-          <a:solidFill>
-            <a:srgbClr val="FF6C3A"/>
-          </a:solidFill>
-        </p:spPr>
-        <p:style>
-          <a:lnRef idx="2">
-            <a:schemeClr val="accent1">
-              <a:shade val="50000"/>
-            </a:schemeClr>
-          </a:lnRef>
-          <a:fillRef idx="1">
-            <a:schemeClr val="accent1"/>
-          </a:fillRef>
-          <a:effectRef idx="0">
-            <a:schemeClr val="accent1"/>
-          </a:effectRef>
-          <a:fontRef idx="minor">
-            <a:schemeClr val="lt1"/>
-          </a:fontRef>
-        </p:style>
-        <p:txBody>
-          <a:bodyPr lIns="91440" tIns="45720" rIns="91440" bIns="45720" rtlCol="0" anchor="ctr"/>
-          <a:lstStyle/>
-          <a:p>
-            <a:pPr algn="ctr"/>
-            <a:r>
-              <a:rPr lang="en-US" b="1" dirty="0">
-                <a:cs typeface="Calibri"/>
-              </a:rPr>
-              <a:t>Строки</a:t>
-            </a:r>
-            <a:endParaRPr lang="en-US" b="1" dirty="0" err="1"/>
-          </a:p>
-        </p:txBody>
-      </p:sp>
-      <p:grpSp>
-        <p:nvGrpSpPr>
-          <p:cNvPr id="12" name="Group 11">
-            <a:extLst>
-              <a:ext uri="{FF2B5EF4-FFF2-40B4-BE49-F238E27FC236}">
-                <a16:creationId xmlns:a16="http://schemas.microsoft.com/office/drawing/2014/main" id="{5B6A03DC-79D0-400E-AB0B-6343140E98BC}"/>
-              </a:ext>
-            </a:extLst>
-          </p:cNvPr>
-          <p:cNvGrpSpPr/>
-          <p:nvPr/>
-        </p:nvGrpSpPr>
-        <p:grpSpPr>
-          <a:xfrm>
-            <a:off x="2476966" y="2943280"/>
-            <a:ext cx="3010827" cy="1485148"/>
-            <a:chOff x="2476966" y="2943280"/>
-            <a:chExt cx="3010827" cy="1485148"/>
-          </a:xfrm>
-        </p:grpSpPr>
-        <p:sp>
-          <p:nvSpPr>
-            <p:cNvPr id="8" name="Arrow: Down 7">
-              <a:extLst>
-                <a:ext uri="{FF2B5EF4-FFF2-40B4-BE49-F238E27FC236}">
-                  <a16:creationId xmlns:a16="http://schemas.microsoft.com/office/drawing/2014/main" id="{451256DB-4718-4826-AFAA-40723CAF37C4}"/>
-                </a:ext>
-              </a:extLst>
-            </p:cNvPr>
-            <p:cNvSpPr/>
-            <p:nvPr/>
-          </p:nvSpPr>
-          <p:spPr>
-            <a:xfrm rot="1980000">
-              <a:off x="4723460" y="2943280"/>
-              <a:ext cx="483219" cy="659780"/>
-            </a:xfrm>
-            <a:prstGeom prst="downArrow">
-              <a:avLst/>
-            </a:prstGeom>
-            <a:solidFill>
-              <a:srgbClr val="001D3C"/>
-            </a:solidFill>
-          </p:spPr>
-          <p:style>
-            <a:lnRef idx="2">
-              <a:schemeClr val="accent1">
-                <a:shade val="50000"/>
-              </a:schemeClr>
-            </a:lnRef>
-            <a:fillRef idx="1">
-              <a:schemeClr val="accent1"/>
-            </a:fillRef>
-            <a:effectRef idx="0">
-              <a:schemeClr val="accent1"/>
-            </a:effectRef>
-            <a:fontRef idx="minor">
-              <a:schemeClr val="lt1"/>
-            </a:fontRef>
-          </p:style>
-          <p:txBody>
-            <a:bodyPr rtlCol="0" anchor="ctr"/>
-            <a:lstStyle/>
-            <a:p>
-              <a:pPr algn="ctr"/>
-              <a:endParaRPr lang="en-US"/>
-            </a:p>
-          </p:txBody>
-        </p:sp>
-        <p:sp>
-          <p:nvSpPr>
-            <p:cNvPr id="10" name="Rectangle: Rounded Corners 9">
-              <a:extLst>
-                <a:ext uri="{FF2B5EF4-FFF2-40B4-BE49-F238E27FC236}">
-                  <a16:creationId xmlns:a16="http://schemas.microsoft.com/office/drawing/2014/main" id="{4E1B57F4-57F6-41C8-AECC-D7149EC5BCDA}"/>
-                </a:ext>
-              </a:extLst>
-            </p:cNvPr>
-            <p:cNvSpPr/>
-            <p:nvPr/>
-          </p:nvSpPr>
-          <p:spPr>
-            <a:xfrm>
-              <a:off x="2476966" y="3787233"/>
-              <a:ext cx="3010827" cy="641195"/>
-            </a:xfrm>
-            <a:prstGeom prst="roundRect">
-              <a:avLst/>
-            </a:prstGeom>
-            <a:solidFill>
-              <a:srgbClr val="FF6C3A"/>
-            </a:solidFill>
-          </p:spPr>
-          <p:style>
-            <a:lnRef idx="2">
-              <a:schemeClr val="accent1">
-                <a:shade val="50000"/>
-              </a:schemeClr>
-            </a:lnRef>
-            <a:fillRef idx="1">
-              <a:schemeClr val="accent1"/>
-            </a:fillRef>
-            <a:effectRef idx="0">
-              <a:schemeClr val="accent1"/>
-            </a:effectRef>
-            <a:fontRef idx="minor">
-              <a:schemeClr val="lt1"/>
-            </a:fontRef>
-          </p:style>
-          <p:txBody>
-            <a:bodyPr rtlCol="0" anchor="ctr"/>
-            <a:lstStyle/>
-            <a:p>
-              <a:pPr algn="ctr"/>
-              <a:r>
-                <a:rPr lang="en-US" dirty="0" err="1">
-                  <a:cs typeface="Calibri"/>
-                </a:rPr>
-                <a:t>Проверка</a:t>
-              </a:r>
-              <a:r>
-                <a:rPr lang="en-US" dirty="0">
-                  <a:cs typeface="Calibri"/>
-                </a:rPr>
-                <a:t> </a:t>
-              </a:r>
-              <a:r>
-                <a:rPr lang="en-US" dirty="0" err="1">
-                  <a:cs typeface="Calibri"/>
-                </a:rPr>
-                <a:t>принадлежности</a:t>
-              </a:r>
-              <a:endParaRPr lang="en-US" dirty="0" err="1"/>
-            </a:p>
-          </p:txBody>
-        </p:sp>
-      </p:grpSp>
-      <p:grpSp>
-        <p:nvGrpSpPr>
-          <p:cNvPr id="13" name="Group 12">
-            <a:extLst>
-              <a:ext uri="{FF2B5EF4-FFF2-40B4-BE49-F238E27FC236}">
-                <a16:creationId xmlns:a16="http://schemas.microsoft.com/office/drawing/2014/main" id="{F8D68F03-2463-4891-8B7B-BBECD26E3207}"/>
-              </a:ext>
-            </a:extLst>
-          </p:cNvPr>
-          <p:cNvGrpSpPr/>
-          <p:nvPr/>
-        </p:nvGrpSpPr>
-        <p:grpSpPr>
-          <a:xfrm>
-            <a:off x="6630795" y="2943280"/>
-            <a:ext cx="3010827" cy="1485148"/>
-            <a:chOff x="6630795" y="2943280"/>
-            <a:chExt cx="3010827" cy="1485148"/>
-          </a:xfrm>
-        </p:grpSpPr>
-        <p:sp>
-          <p:nvSpPr>
-            <p:cNvPr id="9" name="Arrow: Down 8">
-              <a:extLst>
-                <a:ext uri="{FF2B5EF4-FFF2-40B4-BE49-F238E27FC236}">
-                  <a16:creationId xmlns:a16="http://schemas.microsoft.com/office/drawing/2014/main" id="{851FA8E3-0CE0-46C4-A7D3-7E495615ECDC}"/>
-                </a:ext>
-              </a:extLst>
-            </p:cNvPr>
-            <p:cNvSpPr/>
-            <p:nvPr/>
-          </p:nvSpPr>
-          <p:spPr>
-            <a:xfrm rot="-2160000">
-              <a:off x="6712094" y="2943280"/>
-              <a:ext cx="483219" cy="659780"/>
-            </a:xfrm>
-            <a:prstGeom prst="downArrow">
-              <a:avLst/>
-            </a:prstGeom>
-            <a:solidFill>
-              <a:srgbClr val="001D3C"/>
-            </a:solidFill>
-          </p:spPr>
-          <p:style>
-            <a:lnRef idx="2">
-              <a:schemeClr val="accent1">
-                <a:shade val="50000"/>
-              </a:schemeClr>
-            </a:lnRef>
-            <a:fillRef idx="1">
-              <a:schemeClr val="accent1"/>
-            </a:fillRef>
-            <a:effectRef idx="0">
-              <a:schemeClr val="accent1"/>
-            </a:effectRef>
-            <a:fontRef idx="minor">
-              <a:schemeClr val="lt1"/>
-            </a:fontRef>
-          </p:style>
-          <p:txBody>
-            <a:bodyPr lIns="91440" tIns="45720" rIns="91440" bIns="45720" rtlCol="0" anchor="ctr"/>
-            <a:lstStyle/>
-            <a:p>
-              <a:pPr algn="ctr"/>
-              <a:endParaRPr lang="en-US" dirty="0">
-                <a:solidFill>
-                  <a:srgbClr val="001D3C"/>
-                </a:solidFill>
-                <a:cs typeface="Calibri"/>
-              </a:endParaRPr>
-            </a:p>
-          </p:txBody>
-        </p:sp>
-        <p:sp>
-          <p:nvSpPr>
-            <p:cNvPr id="11" name="Rectangle: Rounded Corners 10">
-              <a:extLst>
-                <a:ext uri="{FF2B5EF4-FFF2-40B4-BE49-F238E27FC236}">
-                  <a16:creationId xmlns:a16="http://schemas.microsoft.com/office/drawing/2014/main" id="{A78E3998-C2BC-48AA-ADE7-CF1CBF32F620}"/>
-                </a:ext>
-              </a:extLst>
-            </p:cNvPr>
-            <p:cNvSpPr/>
-            <p:nvPr/>
-          </p:nvSpPr>
-          <p:spPr>
-            <a:xfrm>
-              <a:off x="6630795" y="3787233"/>
-              <a:ext cx="3010827" cy="641195"/>
-            </a:xfrm>
-            <a:prstGeom prst="roundRect">
-              <a:avLst/>
-            </a:prstGeom>
-            <a:solidFill>
-              <a:srgbClr val="FF6C3A"/>
-            </a:solidFill>
-          </p:spPr>
-          <p:style>
-            <a:lnRef idx="2">
-              <a:schemeClr val="accent1">
-                <a:shade val="50000"/>
-              </a:schemeClr>
-            </a:lnRef>
-            <a:fillRef idx="1">
-              <a:schemeClr val="accent1"/>
-            </a:fillRef>
-            <a:effectRef idx="0">
-              <a:schemeClr val="accent1"/>
-            </a:effectRef>
-            <a:fontRef idx="minor">
-              <a:schemeClr val="lt1"/>
-            </a:fontRef>
-          </p:style>
-          <p:txBody>
-            <a:bodyPr lIns="91440" tIns="45720" rIns="91440" bIns="45720" rtlCol="0" anchor="ctr"/>
-            <a:lstStyle/>
-            <a:p>
-              <a:pPr algn="ctr"/>
-              <a:r>
-                <a:rPr lang="en-US" dirty="0" err="1">
-                  <a:cs typeface="Calibri"/>
-                </a:rPr>
-                <a:t>Оператор</a:t>
-              </a:r>
-              <a:r>
-                <a:rPr lang="en-US" dirty="0">
-                  <a:cs typeface="Calibri"/>
-                </a:rPr>
-                <a:t> </a:t>
-              </a:r>
-              <a:r>
-                <a:rPr lang="en-US" dirty="0" err="1">
-                  <a:cs typeface="Calibri"/>
-                </a:rPr>
-                <a:t>индексирования</a:t>
-              </a:r>
-            </a:p>
-          </p:txBody>
-        </p:sp>
-      </p:grpSp>
-    </p:spTree>
-    <p:extLst>
-      <p:ext uri="{BB962C8B-B14F-4D97-AF65-F5344CB8AC3E}">
-        <p14:creationId xmlns:p14="http://schemas.microsoft.com/office/powerpoint/2010/main" val="2316149695"/>
-      </p:ext>
-    </p:extLst>
-  </p:cSld>
-  <p:clrMapOvr>
-    <a:masterClrMapping/>
-  </p:clrMapOvr>
-  <p:timing>
-    <p:tnLst>
-      <p:par>
-        <p:cTn id="1" dur="indefinite" restart="never" nodeType="tmRoot">
-          <p:childTnLst>
-            <p:seq concurrent="1" nextAc="seek">
-              <p:cTn id="2" dur="indefinite" nodeType="mainSeq">
-                <p:childTnLst>
-                  <p:par>
-                    <p:cTn id="3" fill="hold">
-                      <p:stCondLst>
-                        <p:cond delay="indefinite"/>
-                      </p:stCondLst>
-                      <p:childTnLst>
-                        <p:par>
-                          <p:cTn id="4" fill="hold">
-                            <p:stCondLst>
-                              <p:cond delay="0"/>
-                            </p:stCondLst>
-                            <p:childTnLst>
-                              <p:par>
-                                <p:cTn id="5" presetID="10" presetClass="entr" presetSubtype="0" fill="hold" grpId="0" nodeType="clickEffect">
-                                  <p:stCondLst>
-                                    <p:cond delay="0"/>
-                                  </p:stCondLst>
-                                  <p:childTnLst>
-                                    <p:set>
-                                      <p:cBhvr>
-                                        <p:cTn id="6" dur="1" fill="hold">
-                                          <p:stCondLst>
-                                            <p:cond delay="0"/>
-                                          </p:stCondLst>
-                                        </p:cTn>
-                                        <p:tgtEl>
-                                          <p:spTgt spid="2"/>
-                                        </p:tgtEl>
-                                        <p:attrNameLst>
-                                          <p:attrName>style.visibility</p:attrName>
-                                        </p:attrNameLst>
-                                      </p:cBhvr>
-                                      <p:to>
-                                        <p:strVal val="visible"/>
-                                      </p:to>
-                                    </p:set>
-                                    <p:animEffect transition="in" filter="fade">
-                                      <p:cBhvr>
-                                        <p:cTn id="7" dur="500"/>
-                                        <p:tgtEl>
-                                          <p:spTgt spid="2"/>
-                                        </p:tgtEl>
-                                      </p:cBhvr>
-                                    </p:animEffect>
-                                  </p:childTnLst>
-                                </p:cTn>
-                              </p:par>
-                            </p:childTnLst>
-                          </p:cTn>
-                        </p:par>
-                      </p:childTnLst>
-                    </p:cTn>
-                  </p:par>
-                  <p:par>
-                    <p:cTn id="8" fill="hold">
-                      <p:stCondLst>
-                        <p:cond delay="indefinite"/>
-                      </p:stCondLst>
-                      <p:childTnLst>
-                        <p:par>
-                          <p:cTn id="9" fill="hold">
-                            <p:stCondLst>
-                              <p:cond delay="0"/>
-                            </p:stCondLst>
-                            <p:childTnLst>
-                              <p:par>
-                                <p:cTn id="10" presetID="10" presetClass="entr" presetSubtype="0" fill="hold" grpId="0" nodeType="clickEffect">
-                                  <p:stCondLst>
-                                    <p:cond delay="0"/>
-                                  </p:stCondLst>
-                                  <p:childTnLst>
-                                    <p:set>
-                                      <p:cBhvr>
-                                        <p:cTn id="11" dur="1" fill="hold">
-                                          <p:stCondLst>
-                                            <p:cond delay="0"/>
-                                          </p:stCondLst>
-                                        </p:cTn>
-                                        <p:tgtEl>
-                                          <p:spTgt spid="6"/>
-                                        </p:tgtEl>
-                                        <p:attrNameLst>
-                                          <p:attrName>style.visibility</p:attrName>
-                                        </p:attrNameLst>
-                                      </p:cBhvr>
-                                      <p:to>
-                                        <p:strVal val="visible"/>
-                                      </p:to>
-                                    </p:set>
-                                    <p:animEffect transition="in" filter="fade">
-                                      <p:cBhvr>
-                                        <p:cTn id="12" dur="500"/>
-                                        <p:tgtEl>
-                                          <p:spTgt spid="6"/>
-                                        </p:tgtEl>
-                                      </p:cBhvr>
-                                    </p:animEffect>
-                                  </p:childTnLst>
-                                </p:cTn>
-                              </p:par>
-                            </p:childTnLst>
-                          </p:cTn>
-                        </p:par>
-                      </p:childTnLst>
-                    </p:cTn>
-                  </p:par>
-                  <p:par>
-                    <p:cTn id="13" fill="hold">
-                      <p:stCondLst>
-                        <p:cond delay="indefinite"/>
-                      </p:stCondLst>
-                      <p:childTnLst>
-                        <p:par>
-                          <p:cTn id="14" fill="hold">
-                            <p:stCondLst>
-                              <p:cond delay="0"/>
-                            </p:stCondLst>
-                            <p:childTnLst>
-                              <p:par>
-                                <p:cTn id="15" presetID="10" presetClass="entr" presetSubtype="0" fill="hold" grpId="0" nodeType="clickEffect">
-                                  <p:stCondLst>
-                                    <p:cond delay="0"/>
-                                  </p:stCondLst>
-                                  <p:childTnLst>
-                                    <p:set>
-                                      <p:cBhvr>
-                                        <p:cTn id="16" dur="1" fill="hold">
-                                          <p:stCondLst>
-                                            <p:cond delay="0"/>
-                                          </p:stCondLst>
-                                        </p:cTn>
-                                        <p:tgtEl>
-                                          <p:spTgt spid="7"/>
-                                        </p:tgtEl>
-                                        <p:attrNameLst>
-                                          <p:attrName>style.visibility</p:attrName>
-                                        </p:attrNameLst>
-                                      </p:cBhvr>
-                                      <p:to>
-                                        <p:strVal val="visible"/>
-                                      </p:to>
-                                    </p:set>
-                                    <p:animEffect transition="in" filter="fade">
-                                      <p:cBhvr>
-                                        <p:cTn id="17" dur="500"/>
-                                        <p:tgtEl>
-                                          <p:spTgt spid="7"/>
-                                        </p:tgtEl>
-                                      </p:cBhvr>
-                                    </p:animEffect>
-                                  </p:childTnLst>
-                                </p:cTn>
-                              </p:par>
-                            </p:childTnLst>
-                          </p:cTn>
-                        </p:par>
-                      </p:childTnLst>
-                    </p:cTn>
-                  </p:par>
-                  <p:par>
-                    <p:cTn id="18" fill="hold">
-                      <p:stCondLst>
-                        <p:cond delay="indefinite"/>
-                      </p:stCondLst>
-                      <p:childTnLst>
-                        <p:par>
-                          <p:cTn id="19" fill="hold">
-                            <p:stCondLst>
-                              <p:cond delay="0"/>
-                            </p:stCondLst>
-                            <p:childTnLst>
-                              <p:par>
-                                <p:cTn id="20" presetID="10" presetClass="entr" presetSubtype="0" fill="hold" nodeType="clickEffect">
-                                  <p:stCondLst>
-                                    <p:cond delay="0"/>
-                                  </p:stCondLst>
-                                  <p:childTnLst>
-                                    <p:set>
-                                      <p:cBhvr>
-                                        <p:cTn id="21" dur="1" fill="hold">
-                                          <p:stCondLst>
-                                            <p:cond delay="0"/>
-                                          </p:stCondLst>
-                                        </p:cTn>
-                                        <p:tgtEl>
-                                          <p:spTgt spid="12"/>
-                                        </p:tgtEl>
-                                        <p:attrNameLst>
-                                          <p:attrName>style.visibility</p:attrName>
-                                        </p:attrNameLst>
-                                      </p:cBhvr>
-                                      <p:to>
-                                        <p:strVal val="visible"/>
-                                      </p:to>
-                                    </p:set>
-                                    <p:animEffect transition="in" filter="fade">
-                                      <p:cBhvr>
-                                        <p:cTn id="22" dur="500"/>
-                                        <p:tgtEl>
-                                          <p:spTgt spid="12"/>
-                                        </p:tgtEl>
-                                      </p:cBhvr>
-                                    </p:animEffect>
-                                  </p:childTnLst>
-                                </p:cTn>
-                              </p:par>
-                            </p:childTnLst>
-                          </p:cTn>
-                        </p:par>
-                      </p:childTnLst>
-                    </p:cTn>
-                  </p:par>
-                  <p:par>
-                    <p:cTn id="23" fill="hold">
-                      <p:stCondLst>
-                        <p:cond delay="indefinite"/>
-                      </p:stCondLst>
-                      <p:childTnLst>
-                        <p:par>
-                          <p:cTn id="24" fill="hold">
-                            <p:stCondLst>
-                              <p:cond delay="0"/>
-                            </p:stCondLst>
-                            <p:childTnLst>
-                              <p:par>
-                                <p:cTn id="25" presetID="10" presetClass="entr" presetSubtype="0" fill="hold" nodeType="clickEffect">
-                                  <p:stCondLst>
-                                    <p:cond delay="0"/>
-                                  </p:stCondLst>
-                                  <p:childTnLst>
-                                    <p:set>
-                                      <p:cBhvr>
-                                        <p:cTn id="26" dur="1" fill="hold">
-                                          <p:stCondLst>
-                                            <p:cond delay="0"/>
-                                          </p:stCondLst>
-                                        </p:cTn>
-                                        <p:tgtEl>
-                                          <p:spTgt spid="13"/>
-                                        </p:tgtEl>
-                                        <p:attrNameLst>
-                                          <p:attrName>style.visibility</p:attrName>
-                                        </p:attrNameLst>
-                                      </p:cBhvr>
-                                      <p:to>
-                                        <p:strVal val="visible"/>
-                                      </p:to>
-                                    </p:set>
-                                    <p:animEffect transition="in" filter="fade">
-                                      <p:cBhvr>
-                                        <p:cTn id="27" dur="500"/>
-                                        <p:tgtEl>
-                                          <p:spTgt spid="13"/>
-                                        </p:tgtEl>
-                                      </p:cBhvr>
-                                    </p:animEffect>
-                                  </p:childTnLst>
-                                </p:cTn>
-                              </p:par>
-                            </p:childTnLst>
-                          </p:cTn>
-                        </p:par>
-                      </p:childTnLst>
-                    </p:cTn>
-                  </p:par>
-                </p:childTnLst>
-              </p:cTn>
-              <p:prevCondLst>
-                <p:cond evt="onPrev" delay="0">
-                  <p:tgtEl>
-                    <p:sldTgt/>
-                  </p:tgtEl>
-                </p:cond>
-              </p:prevCondLst>
-              <p:nextCondLst>
-                <p:cond evt="onNext" delay="0">
-                  <p:tgtEl>
-                    <p:sldTgt/>
-                  </p:tgtEl>
-                </p:cond>
-              </p:nextCondLst>
-            </p:seq>
-          </p:childTnLst>
-        </p:cTn>
-      </p:par>
-    </p:tnLst>
-    <p:bldLst>
-      <p:bldP spid="2" grpId="0" animBg="1"/>
-      <p:bldP spid="6" grpId="0" animBg="1"/>
-      <p:bldP spid="7" grpId="0" animBg="1"/>
     </p:bldLst>
   </p:timing>
 </p:sld>

</xml_diff>